<commit_message>
Change folder names and restructure
</commit_message>
<xml_diff>
--- a/Synopsis Presentation.pptx
+++ b/Synopsis Presentation.pptx
@@ -5,7 +5,7 @@
     <p:sldMasterId id="2147483648" r:id="rId1"/>
   </p:sldMasterIdLst>
   <p:notesMasterIdLst>
-    <p:notesMasterId r:id="rId18"/>
+    <p:notesMasterId r:id="rId17"/>
   </p:notesMasterIdLst>
   <p:sldIdLst>
     <p:sldId id="256" r:id="rId2"/>
@@ -15,30 +15,29 @@
     <p:sldId id="274" r:id="rId6"/>
     <p:sldId id="271" r:id="rId7"/>
     <p:sldId id="275" r:id="rId8"/>
-    <p:sldId id="279" r:id="rId9"/>
-    <p:sldId id="280" r:id="rId10"/>
-    <p:sldId id="281" r:id="rId11"/>
-    <p:sldId id="282" r:id="rId12"/>
-    <p:sldId id="283" r:id="rId13"/>
-    <p:sldId id="285" r:id="rId14"/>
-    <p:sldId id="284" r:id="rId15"/>
-    <p:sldId id="276" r:id="rId16"/>
-    <p:sldId id="278" r:id="rId17"/>
+    <p:sldId id="280" r:id="rId9"/>
+    <p:sldId id="281" r:id="rId10"/>
+    <p:sldId id="282" r:id="rId11"/>
+    <p:sldId id="283" r:id="rId12"/>
+    <p:sldId id="285" r:id="rId13"/>
+    <p:sldId id="284" r:id="rId14"/>
+    <p:sldId id="276" r:id="rId15"/>
+    <p:sldId id="278" r:id="rId16"/>
   </p:sldIdLst>
   <p:sldSz cx="9144000" cy="6858000" type="screen4x3"/>
   <p:notesSz cx="6858000" cy="9144000"/>
   <p:embeddedFontLst>
     <p:embeddedFont>
       <p:font typeface="Avenir Book" panose="02000503020000020003" pitchFamily="2" charset="0"/>
-      <p:regular r:id="rId19"/>
-      <p:italic r:id="rId20"/>
+      <p:regular r:id="rId18"/>
+      <p:italic r:id="rId19"/>
     </p:embeddedFont>
     <p:embeddedFont>
       <p:font typeface="Calibri" panose="020F0502020204030204" pitchFamily="34" charset="0"/>
-      <p:regular r:id="rId21"/>
-      <p:bold r:id="rId22"/>
-      <p:italic r:id="rId23"/>
-      <p:boldItalic r:id="rId24"/>
+      <p:regular r:id="rId20"/>
+      <p:bold r:id="rId21"/>
+      <p:italic r:id="rId22"/>
+      <p:boldItalic r:id="rId23"/>
     </p:embeddedFont>
   </p:embeddedFontLst>
   <p:defaultTextStyle>
@@ -286,7 +285,7 @@
       </p15:sldGuideLst>
     </p:ext>
     <p:ext uri="http://customooxmlschemas.google.com/">
-      <go:slidesCustomData xmlns="" xmlns:mc="http://schemas.openxmlformats.org/markup-compatibility/2006" xmlns:mv="urn:schemas-microsoft-com:mac:vml" xmlns:c="http://schemas.openxmlformats.org/drawingml/2006/chart" xmlns:dgm="http://schemas.openxmlformats.org/drawingml/2006/diagram" xmlns:o="urn:schemas-microsoft-com:office:office" xmlns:v="urn:schemas-microsoft-com:vml" xmlns:pvml="urn:schemas-microsoft-com:office:powerpoint" xmlns:com="http://schemas.openxmlformats.org/drawingml/2006/compatibility" xmlns:p14="http://schemas.microsoft.com/office/powerpoint/2010/main" xmlns:p15="http://schemas.microsoft.com/office/powerpoint/2012/main" xmlns:ahyp="http://schemas.microsoft.com/office/drawing/2018/hyperlinkcolor" xmlns:go="http://customooxmlschemas.google.com/" r:id="rId25" roundtripDataSignature="AMtx7mh8zoFllbMgzQqnF5dJTmCeL5UVzA=="/>
+      <go:slidesCustomData xmlns:go="http://customooxmlschemas.google.com/" xmlns:ahyp="http://schemas.microsoft.com/office/drawing/2018/hyperlinkcolor" xmlns:p15="http://schemas.microsoft.com/office/powerpoint/2012/main" xmlns:p14="http://schemas.microsoft.com/office/powerpoint/2010/main" xmlns:com="http://schemas.openxmlformats.org/drawingml/2006/compatibility" xmlns:pvml="urn:schemas-microsoft-com:office:powerpoint" xmlns:v="urn:schemas-microsoft-com:vml" xmlns:o="urn:schemas-microsoft-com:office:office" xmlns:dgm="http://schemas.openxmlformats.org/drawingml/2006/diagram" xmlns:c="http://schemas.openxmlformats.org/drawingml/2006/chart" xmlns:mv="urn:schemas-microsoft-com:mac:vml" xmlns:mc="http://schemas.openxmlformats.org/markup-compatibility/2006" xmlns="" r:id="rId25" roundtripDataSignature="AMtx7mh8zoFllbMgzQqnF5dJTmCeL5UVzA=="/>
     </p:ext>
   </p:extLst>
 </p:presentation>
@@ -2032,7 +2031,7 @@
     </p:spTree>
     <p:extLst>
       <p:ext uri="{BB962C8B-B14F-4D97-AF65-F5344CB8AC3E}">
-        <p14:creationId xmlns:p14="http://schemas.microsoft.com/office/powerpoint/2010/main" val="1429434442"/>
+        <p14:creationId xmlns:p14="http://schemas.microsoft.com/office/powerpoint/2010/main" val="1284086190"/>
       </p:ext>
     </p:extLst>
   </p:cSld>
@@ -2153,7 +2152,7 @@
     </p:spTree>
     <p:extLst>
       <p:ext uri="{BB962C8B-B14F-4D97-AF65-F5344CB8AC3E}">
-        <p14:creationId xmlns:p14="http://schemas.microsoft.com/office/powerpoint/2010/main" val="1284086190"/>
+        <p14:creationId xmlns:p14="http://schemas.microsoft.com/office/powerpoint/2010/main" val="1808297024"/>
       </p:ext>
     </p:extLst>
   </p:cSld>
@@ -2274,7 +2273,7 @@
     </p:spTree>
     <p:extLst>
       <p:ext uri="{BB962C8B-B14F-4D97-AF65-F5344CB8AC3E}">
-        <p14:creationId xmlns:p14="http://schemas.microsoft.com/office/powerpoint/2010/main" val="1808297024"/>
+        <p14:creationId xmlns:p14="http://schemas.microsoft.com/office/powerpoint/2010/main" val="1988339114"/>
       </p:ext>
     </p:extLst>
   </p:cSld>
@@ -2395,7 +2394,7 @@
     </p:spTree>
     <p:extLst>
       <p:ext uri="{BB962C8B-B14F-4D97-AF65-F5344CB8AC3E}">
-        <p14:creationId xmlns:p14="http://schemas.microsoft.com/office/powerpoint/2010/main" val="1988339114"/>
+        <p14:creationId xmlns:p14="http://schemas.microsoft.com/office/powerpoint/2010/main" val="4216101401"/>
       </p:ext>
     </p:extLst>
   </p:cSld>
@@ -2449,10 +2448,6 @@
           <a:bodyPr/>
           <a:lstStyle/>
           <a:p>
-            <a:pPr marL="228600" indent="0">
-              <a:buFont typeface="+mj-lt"/>
-              <a:buNone/>
-            </a:pPr>
             <a:endParaRPr lang="en-US" dirty="0"/>
           </a:p>
         </p:txBody>
@@ -2516,7 +2511,7 @@
     </p:spTree>
     <p:extLst>
       <p:ext uri="{BB962C8B-B14F-4D97-AF65-F5344CB8AC3E}">
-        <p14:creationId xmlns:p14="http://schemas.microsoft.com/office/powerpoint/2010/main" val="4216101401"/>
+        <p14:creationId xmlns:p14="http://schemas.microsoft.com/office/powerpoint/2010/main" val="2544798044"/>
       </p:ext>
     </p:extLst>
   </p:cSld>
@@ -2617,123 +2612,6 @@
                 <a:sym typeface="Calibri"/>
               </a:rPr>
               <a:t>15</a:t>
-            </a:fld>
-            <a:endParaRPr lang="en-US" sz="1200" b="0" i="0" u="none" strike="noStrike" cap="none">
-              <a:solidFill>
-                <a:schemeClr val="dk1"/>
-              </a:solidFill>
-              <a:latin typeface="Calibri"/>
-              <a:ea typeface="Calibri"/>
-              <a:cs typeface="Calibri"/>
-              <a:sym typeface="Calibri"/>
-            </a:endParaRPr>
-          </a:p>
-        </p:txBody>
-      </p:sp>
-    </p:spTree>
-    <p:extLst>
-      <p:ext uri="{BB962C8B-B14F-4D97-AF65-F5344CB8AC3E}">
-        <p14:creationId xmlns:p14="http://schemas.microsoft.com/office/powerpoint/2010/main" val="2544798044"/>
-      </p:ext>
-    </p:extLst>
-  </p:cSld>
-  <p:clrMapOvr>
-    <a:masterClrMapping/>
-  </p:clrMapOvr>
-</p:notes>
-</file>
-
-<file path=ppt/notesSlides/notesSlide16.xml><?xml version="1.0" encoding="utf-8"?>
-<p:notes xmlns:a="http://schemas.openxmlformats.org/drawingml/2006/main" xmlns:r="http://schemas.openxmlformats.org/officeDocument/2006/relationships" xmlns:p="http://schemas.openxmlformats.org/presentationml/2006/main">
-  <p:cSld>
-    <p:spTree>
-      <p:nvGrpSpPr>
-        <p:cNvPr id="1" name=""/>
-        <p:cNvGrpSpPr/>
-        <p:nvPr/>
-      </p:nvGrpSpPr>
-      <p:grpSpPr>
-        <a:xfrm>
-          <a:off x="0" y="0"/>
-          <a:ext cx="0" cy="0"/>
-          <a:chOff x="0" y="0"/>
-          <a:chExt cx="0" cy="0"/>
-        </a:xfrm>
-      </p:grpSpPr>
-      <p:sp>
-        <p:nvSpPr>
-          <p:cNvPr id="2" name="Slide Image Placeholder 1"/>
-          <p:cNvSpPr>
-            <a:spLocks noGrp="1" noRot="1" noChangeAspect="1"/>
-          </p:cNvSpPr>
-          <p:nvPr>
-            <p:ph type="sldImg"/>
-          </p:nvPr>
-        </p:nvSpPr>
-        <p:spPr/>
-      </p:sp>
-      <p:sp>
-        <p:nvSpPr>
-          <p:cNvPr id="3" name="Notes Placeholder 2"/>
-          <p:cNvSpPr>
-            <a:spLocks noGrp="1"/>
-          </p:cNvSpPr>
-          <p:nvPr>
-            <p:ph type="body" idx="1"/>
-          </p:nvPr>
-        </p:nvSpPr>
-        <p:spPr/>
-        <p:txBody>
-          <a:bodyPr/>
-          <a:lstStyle/>
-          <a:p>
-            <a:endParaRPr lang="en-US" dirty="0"/>
-          </a:p>
-        </p:txBody>
-      </p:sp>
-      <p:sp>
-        <p:nvSpPr>
-          <p:cNvPr id="4" name="Slide Number Placeholder 3"/>
-          <p:cNvSpPr>
-            <a:spLocks noGrp="1"/>
-          </p:cNvSpPr>
-          <p:nvPr>
-            <p:ph type="sldNum" idx="12"/>
-          </p:nvPr>
-        </p:nvSpPr>
-        <p:spPr/>
-        <p:txBody>
-          <a:bodyPr/>
-          <a:lstStyle/>
-          <a:p>
-            <a:pPr marL="0" marR="0" lvl="0" indent="0" algn="r" rtl="0">
-              <a:lnSpc>
-                <a:spcPct val="100000"/>
-              </a:lnSpc>
-              <a:spcBef>
-                <a:spcPts val="0"/>
-              </a:spcBef>
-              <a:spcAft>
-                <a:spcPts val="0"/>
-              </a:spcAft>
-              <a:buClr>
-                <a:srgbClr val="000000"/>
-              </a:buClr>
-              <a:buSzPts val="1200"/>
-              <a:buFont typeface="Arial"/>
-              <a:buNone/>
-            </a:pPr>
-            <a:fld id="{00000000-1234-1234-1234-123412341234}" type="slidenum">
-              <a:rPr lang="en-US" sz="1200" b="0" i="0" u="none" strike="noStrike" cap="none" smtClean="0">
-                <a:solidFill>
-                  <a:schemeClr val="dk1"/>
-                </a:solidFill>
-                <a:latin typeface="Calibri"/>
-                <a:ea typeface="Calibri"/>
-                <a:cs typeface="Calibri"/>
-                <a:sym typeface="Calibri"/>
-              </a:rPr>
-              <a:t>16</a:t>
             </a:fld>
             <a:endParaRPr lang="en-US" sz="1200" b="0" i="0" u="none" strike="noStrike" cap="none">
               <a:solidFill>
@@ -3724,468 +3602,6 @@
               <a:buFont typeface="+mj-lt"/>
               <a:buNone/>
             </a:pPr>
-            <a:r>
-              <a:rPr lang="en-IN" sz="1800" kern="100" dirty="0">
-                <a:effectLst/>
-                <a:latin typeface="Times New Roman" panose="02020603050405020304" pitchFamily="18" charset="0"/>
-                <a:ea typeface="Calibri" panose="020F0502020204030204" pitchFamily="34" charset="0"/>
-                <a:cs typeface="Times New Roman" panose="02020603050405020304" pitchFamily="18" charset="0"/>
-              </a:rPr>
-              <a:t>The main objectives of this project are to develop a secure and efficient blockchain and smart contracts-controlled data sharing platform with multi-user access and role-based authentication. The platform aims to address the vulnerabilities in current data management practices by providing fine-grained access control, persistent metadata management, and robust end-point security measures.</a:t>
-            </a:r>
-            <a:endParaRPr lang="en-IN" sz="1800" kern="100" dirty="0">
-              <a:effectLst/>
-              <a:latin typeface="Calibri" panose="020F0502020204030204" pitchFamily="34" charset="0"/>
-              <a:ea typeface="Calibri" panose="020F0502020204030204" pitchFamily="34" charset="0"/>
-              <a:cs typeface="Times New Roman" panose="02020603050405020304" pitchFamily="18" charset="0"/>
-            </a:endParaRPr>
-          </a:p>
-          <a:p>
-            <a:pPr marL="228600" indent="0">
-              <a:buFont typeface="+mj-lt"/>
-              <a:buNone/>
-            </a:pPr>
-            <a:r>
-              <a:rPr lang="en-IN" sz="1800" kern="100" dirty="0">
-                <a:effectLst/>
-                <a:latin typeface="Times New Roman" panose="02020603050405020304" pitchFamily="18" charset="0"/>
-                <a:ea typeface="Calibri" panose="020F0502020204030204" pitchFamily="34" charset="0"/>
-                <a:cs typeface="Times New Roman" panose="02020603050405020304" pitchFamily="18" charset="0"/>
-              </a:rPr>
-              <a:t> </a:t>
-            </a:r>
-            <a:endParaRPr lang="en-IN" sz="1800" kern="100" dirty="0">
-              <a:effectLst/>
-              <a:latin typeface="Calibri" panose="020F0502020204030204" pitchFamily="34" charset="0"/>
-              <a:ea typeface="Calibri" panose="020F0502020204030204" pitchFamily="34" charset="0"/>
-              <a:cs typeface="Times New Roman" panose="02020603050405020304" pitchFamily="18" charset="0"/>
-            </a:endParaRPr>
-          </a:p>
-          <a:p>
-            <a:pPr marL="0" lvl="0" indent="0">
-              <a:buFont typeface="+mj-lt"/>
-              <a:buNone/>
-            </a:pPr>
-            <a:r>
-              <a:rPr lang="en-IN" sz="1800" kern="100" dirty="0">
-                <a:effectLst/>
-                <a:latin typeface="Times New Roman" panose="02020603050405020304" pitchFamily="18" charset="0"/>
-                <a:ea typeface="Calibri" panose="020F0502020204030204" pitchFamily="34" charset="0"/>
-                <a:cs typeface="Times New Roman" panose="02020603050405020304" pitchFamily="18" charset="0"/>
-              </a:rPr>
-              <a:t>Blockchain-Controlled Data Sharing:</a:t>
-            </a:r>
-            <a:endParaRPr lang="en-IN" sz="1800" kern="100" dirty="0">
-              <a:effectLst/>
-              <a:latin typeface="Calibri" panose="020F0502020204030204" pitchFamily="34" charset="0"/>
-              <a:ea typeface="Calibri" panose="020F0502020204030204" pitchFamily="34" charset="0"/>
-              <a:cs typeface="Times New Roman" panose="02020603050405020304" pitchFamily="18" charset="0"/>
-            </a:endParaRPr>
-          </a:p>
-          <a:p>
-            <a:pPr marL="228600" indent="0">
-              <a:buFont typeface="+mj-lt"/>
-              <a:buNone/>
-            </a:pPr>
-            <a:r>
-              <a:rPr lang="en-IN" sz="1800" kern="100" dirty="0">
-                <a:effectLst/>
-                <a:latin typeface="Times New Roman" panose="02020603050405020304" pitchFamily="18" charset="0"/>
-                <a:ea typeface="Calibri" panose="020F0502020204030204" pitchFamily="34" charset="0"/>
-                <a:cs typeface="Times New Roman" panose="02020603050405020304" pitchFamily="18" charset="0"/>
-              </a:rPr>
-              <a:t>Our primary goal is to create a decentralized data sharing platform leveraging blockchain technology. This will ensure a distributed and tamper-resistant network, eliminating single points of failure and unauthorized access. We will utilize smart contracts to automate data sharing and resource-provisioning processes, to promote transparency and accountability.</a:t>
-            </a:r>
-            <a:endParaRPr lang="en-IN" sz="1800" kern="100" dirty="0">
-              <a:effectLst/>
-              <a:latin typeface="Calibri" panose="020F0502020204030204" pitchFamily="34" charset="0"/>
-              <a:ea typeface="Calibri" panose="020F0502020204030204" pitchFamily="34" charset="0"/>
-              <a:cs typeface="Times New Roman" panose="02020603050405020304" pitchFamily="18" charset="0"/>
-            </a:endParaRPr>
-          </a:p>
-          <a:p>
-            <a:pPr marL="228600" indent="0">
-              <a:buFont typeface="+mj-lt"/>
-              <a:buNone/>
-            </a:pPr>
-            <a:r>
-              <a:rPr lang="en-IN" sz="1800" kern="100" dirty="0">
-                <a:effectLst/>
-                <a:latin typeface="Times New Roman" panose="02020603050405020304" pitchFamily="18" charset="0"/>
-                <a:ea typeface="Calibri" panose="020F0502020204030204" pitchFamily="34" charset="0"/>
-                <a:cs typeface="Times New Roman" panose="02020603050405020304" pitchFamily="18" charset="0"/>
-              </a:rPr>
-              <a:t> </a:t>
-            </a:r>
-            <a:endParaRPr lang="en-IN" sz="1800" kern="100" dirty="0">
-              <a:effectLst/>
-              <a:latin typeface="Calibri" panose="020F0502020204030204" pitchFamily="34" charset="0"/>
-              <a:ea typeface="Calibri" panose="020F0502020204030204" pitchFamily="34" charset="0"/>
-              <a:cs typeface="Times New Roman" panose="02020603050405020304" pitchFamily="18" charset="0"/>
-            </a:endParaRPr>
-          </a:p>
-          <a:p>
-            <a:pPr marL="0" lvl="0" indent="0">
-              <a:buFont typeface="+mj-lt"/>
-              <a:buNone/>
-            </a:pPr>
-            <a:r>
-              <a:rPr lang="en-IN" sz="1800" kern="100" dirty="0">
-                <a:effectLst/>
-                <a:latin typeface="Times New Roman" panose="02020603050405020304" pitchFamily="18" charset="0"/>
-                <a:ea typeface="Calibri" panose="020F0502020204030204" pitchFamily="34" charset="0"/>
-                <a:cs typeface="Times New Roman" panose="02020603050405020304" pitchFamily="18" charset="0"/>
-              </a:rPr>
-              <a:t>Multi-User Access and Role-Based Authentication:</a:t>
-            </a:r>
-            <a:endParaRPr lang="en-IN" sz="1800" kern="100" dirty="0">
-              <a:effectLst/>
-              <a:latin typeface="Calibri" panose="020F0502020204030204" pitchFamily="34" charset="0"/>
-              <a:ea typeface="Calibri" panose="020F0502020204030204" pitchFamily="34" charset="0"/>
-              <a:cs typeface="Times New Roman" panose="02020603050405020304" pitchFamily="18" charset="0"/>
-            </a:endParaRPr>
-          </a:p>
-          <a:p>
-            <a:pPr marL="228600" indent="0">
-              <a:buFont typeface="+mj-lt"/>
-              <a:buNone/>
-            </a:pPr>
-            <a:r>
-              <a:rPr lang="en-IN" sz="1800" kern="100" dirty="0">
-                <a:effectLst/>
-                <a:latin typeface="Times New Roman" panose="02020603050405020304" pitchFamily="18" charset="0"/>
-                <a:ea typeface="Calibri" panose="020F0502020204030204" pitchFamily="34" charset="0"/>
-                <a:cs typeface="Times New Roman" panose="02020603050405020304" pitchFamily="18" charset="0"/>
-              </a:rPr>
-              <a:t>This project will implement a comprehensive user authentication system with role-based access control (RBAC). Different user roles within the organization hierarchy will be granted specific access permissions, enhancing data security and minimizing the risk of unauthorized data exposure. The roles of individuals in the company will also be used to facilitate a Proof of Authority consensus mechanism. </a:t>
-            </a:r>
-            <a:endParaRPr lang="en-IN" sz="1800" kern="100" dirty="0">
-              <a:effectLst/>
-              <a:latin typeface="Calibri" panose="020F0502020204030204" pitchFamily="34" charset="0"/>
-              <a:ea typeface="Calibri" panose="020F0502020204030204" pitchFamily="34" charset="0"/>
-              <a:cs typeface="Times New Roman" panose="02020603050405020304" pitchFamily="18" charset="0"/>
-            </a:endParaRPr>
-          </a:p>
-          <a:p>
-            <a:pPr marL="228600" indent="0">
-              <a:buFont typeface="+mj-lt"/>
-              <a:buNone/>
-            </a:pPr>
-            <a:r>
-              <a:rPr lang="en-IN" sz="1800" kern="100" dirty="0">
-                <a:effectLst/>
-                <a:latin typeface="Times New Roman" panose="02020603050405020304" pitchFamily="18" charset="0"/>
-                <a:ea typeface="Calibri" panose="020F0502020204030204" pitchFamily="34" charset="0"/>
-                <a:cs typeface="Times New Roman" panose="02020603050405020304" pitchFamily="18" charset="0"/>
-              </a:rPr>
-              <a:t> </a:t>
-            </a:r>
-            <a:endParaRPr lang="en-IN" sz="1800" kern="100" dirty="0">
-              <a:effectLst/>
-              <a:latin typeface="Calibri" panose="020F0502020204030204" pitchFamily="34" charset="0"/>
-              <a:ea typeface="Calibri" panose="020F0502020204030204" pitchFamily="34" charset="0"/>
-              <a:cs typeface="Times New Roman" panose="02020603050405020304" pitchFamily="18" charset="0"/>
-            </a:endParaRPr>
-          </a:p>
-          <a:p>
-            <a:pPr marL="0" lvl="0" indent="0">
-              <a:buFont typeface="+mj-lt"/>
-              <a:buNone/>
-            </a:pPr>
-            <a:r>
-              <a:rPr lang="en-IN" sz="1800" kern="100" dirty="0">
-                <a:effectLst/>
-                <a:latin typeface="Times New Roman" panose="02020603050405020304" pitchFamily="18" charset="0"/>
-                <a:ea typeface="Calibri" panose="020F0502020204030204" pitchFamily="34" charset="0"/>
-                <a:cs typeface="Times New Roman" panose="02020603050405020304" pitchFamily="18" charset="0"/>
-              </a:rPr>
-              <a:t>Persistent Metadata Management:</a:t>
-            </a:r>
-            <a:endParaRPr lang="en-IN" sz="1800" kern="100" dirty="0">
-              <a:effectLst/>
-              <a:latin typeface="Calibri" panose="020F0502020204030204" pitchFamily="34" charset="0"/>
-              <a:ea typeface="Calibri" panose="020F0502020204030204" pitchFamily="34" charset="0"/>
-              <a:cs typeface="Times New Roman" panose="02020603050405020304" pitchFamily="18" charset="0"/>
-            </a:endParaRPr>
-          </a:p>
-          <a:p>
-            <a:pPr marL="228600" indent="0">
-              <a:buFont typeface="+mj-lt"/>
-              <a:buNone/>
-            </a:pPr>
-            <a:r>
-              <a:rPr lang="en-IN" sz="1800" kern="100" dirty="0">
-                <a:effectLst/>
-                <a:latin typeface="Times New Roman" panose="02020603050405020304" pitchFamily="18" charset="0"/>
-                <a:ea typeface="Calibri" panose="020F0502020204030204" pitchFamily="34" charset="0"/>
-                <a:cs typeface="Times New Roman" panose="02020603050405020304" pitchFamily="18" charset="0"/>
-              </a:rPr>
-              <a:t>Our platform will incorporate a robust metadata management system to facilitate policy-compliant data classification and access control. Metadata will store vital information related to data ownership, access permissions, update records, and usage policies, and much more, to ensure compliance with company policies and regulatory requirements.</a:t>
-            </a:r>
-            <a:endParaRPr lang="en-IN" sz="1800" kern="100" dirty="0">
-              <a:effectLst/>
-              <a:latin typeface="Calibri" panose="020F0502020204030204" pitchFamily="34" charset="0"/>
-              <a:ea typeface="Calibri" panose="020F0502020204030204" pitchFamily="34" charset="0"/>
-              <a:cs typeface="Times New Roman" panose="02020603050405020304" pitchFamily="18" charset="0"/>
-            </a:endParaRPr>
-          </a:p>
-          <a:p>
-            <a:pPr marL="228600" indent="0">
-              <a:buFont typeface="+mj-lt"/>
-              <a:buNone/>
-            </a:pPr>
-            <a:r>
-              <a:rPr lang="en-IN" sz="1800" kern="100" dirty="0">
-                <a:effectLst/>
-                <a:latin typeface="Times New Roman" panose="02020603050405020304" pitchFamily="18" charset="0"/>
-                <a:ea typeface="Calibri" panose="020F0502020204030204" pitchFamily="34" charset="0"/>
-                <a:cs typeface="Times New Roman" panose="02020603050405020304" pitchFamily="18" charset="0"/>
-              </a:rPr>
-              <a:t> </a:t>
-            </a:r>
-            <a:endParaRPr lang="en-IN" sz="1800" kern="100" dirty="0">
-              <a:effectLst/>
-              <a:latin typeface="Calibri" panose="020F0502020204030204" pitchFamily="34" charset="0"/>
-              <a:ea typeface="Calibri" panose="020F0502020204030204" pitchFamily="34" charset="0"/>
-              <a:cs typeface="Times New Roman" panose="02020603050405020304" pitchFamily="18" charset="0"/>
-            </a:endParaRPr>
-          </a:p>
-          <a:p>
-            <a:pPr marL="0" lvl="0" indent="0">
-              <a:buFont typeface="+mj-lt"/>
-              <a:buNone/>
-            </a:pPr>
-            <a:r>
-              <a:rPr lang="en-IN" sz="1800" kern="100" dirty="0">
-                <a:effectLst/>
-                <a:latin typeface="Times New Roman" panose="02020603050405020304" pitchFamily="18" charset="0"/>
-                <a:ea typeface="Calibri" panose="020F0502020204030204" pitchFamily="34" charset="0"/>
-                <a:cs typeface="Times New Roman" panose="02020603050405020304" pitchFamily="18" charset="0"/>
-              </a:rPr>
-              <a:t>End-Point Security Measures:</a:t>
-            </a:r>
-            <a:endParaRPr lang="en-IN" sz="1800" kern="100" dirty="0">
-              <a:effectLst/>
-              <a:latin typeface="Calibri" panose="020F0502020204030204" pitchFamily="34" charset="0"/>
-              <a:ea typeface="Calibri" panose="020F0502020204030204" pitchFamily="34" charset="0"/>
-              <a:cs typeface="Times New Roman" panose="02020603050405020304" pitchFamily="18" charset="0"/>
-            </a:endParaRPr>
-          </a:p>
-          <a:p>
-            <a:pPr marL="228600" indent="0">
-              <a:buFont typeface="+mj-lt"/>
-              <a:buNone/>
-            </a:pPr>
-            <a:r>
-              <a:rPr lang="en-IN" sz="1800" kern="100" dirty="0">
-                <a:effectLst/>
-                <a:latin typeface="Times New Roman" panose="02020603050405020304" pitchFamily="18" charset="0"/>
-                <a:ea typeface="Calibri" panose="020F0502020204030204" pitchFamily="34" charset="0"/>
-                <a:cs typeface="Times New Roman" panose="02020603050405020304" pitchFamily="18" charset="0"/>
-              </a:rPr>
-              <a:t>To enhance user interactions' security, our project will implement end-point security measures. Secure communication protocols will be employed to safeguard data transmission between clients and the platform. </a:t>
-            </a:r>
-            <a:endParaRPr lang="en-IN" sz="1800" kern="100" dirty="0">
-              <a:effectLst/>
-              <a:latin typeface="Calibri" panose="020F0502020204030204" pitchFamily="34" charset="0"/>
-              <a:ea typeface="Calibri" panose="020F0502020204030204" pitchFamily="34" charset="0"/>
-              <a:cs typeface="Times New Roman" panose="02020603050405020304" pitchFamily="18" charset="0"/>
-            </a:endParaRPr>
-          </a:p>
-          <a:p>
-            <a:pPr marL="228600" indent="0">
-              <a:buFont typeface="+mj-lt"/>
-              <a:buNone/>
-            </a:pPr>
-            <a:r>
-              <a:rPr lang="en-IN" sz="1800" kern="100" dirty="0">
-                <a:effectLst/>
-                <a:latin typeface="Times New Roman" panose="02020603050405020304" pitchFamily="18" charset="0"/>
-                <a:ea typeface="Calibri" panose="020F0502020204030204" pitchFamily="34" charset="0"/>
-                <a:cs typeface="Times New Roman" panose="02020603050405020304" pitchFamily="18" charset="0"/>
-              </a:rPr>
-              <a:t> </a:t>
-            </a:r>
-            <a:endParaRPr lang="en-IN" sz="1800" kern="100" dirty="0">
-              <a:effectLst/>
-              <a:latin typeface="Calibri" panose="020F0502020204030204" pitchFamily="34" charset="0"/>
-              <a:ea typeface="Calibri" panose="020F0502020204030204" pitchFamily="34" charset="0"/>
-              <a:cs typeface="Times New Roman" panose="02020603050405020304" pitchFamily="18" charset="0"/>
-            </a:endParaRPr>
-          </a:p>
-          <a:p>
-            <a:pPr marL="0" lvl="0" indent="0">
-              <a:buFont typeface="+mj-lt"/>
-              <a:buNone/>
-            </a:pPr>
-            <a:r>
-              <a:rPr lang="en-IN" sz="1800" kern="100" dirty="0">
-                <a:effectLst/>
-                <a:latin typeface="Times New Roman" panose="02020603050405020304" pitchFamily="18" charset="0"/>
-                <a:ea typeface="Calibri" panose="020F0502020204030204" pitchFamily="34" charset="0"/>
-                <a:cs typeface="Times New Roman" panose="02020603050405020304" pitchFamily="18" charset="0"/>
-              </a:rPr>
-              <a:t>Encryption with Integrity Controls:</a:t>
-            </a:r>
-            <a:endParaRPr lang="en-IN" sz="1800" kern="100" dirty="0">
-              <a:effectLst/>
-              <a:latin typeface="Calibri" panose="020F0502020204030204" pitchFamily="34" charset="0"/>
-              <a:ea typeface="Calibri" panose="020F0502020204030204" pitchFamily="34" charset="0"/>
-              <a:cs typeface="Times New Roman" panose="02020603050405020304" pitchFamily="18" charset="0"/>
-            </a:endParaRPr>
-          </a:p>
-          <a:p>
-            <a:pPr marL="228600" indent="0">
-              <a:buFont typeface="+mj-lt"/>
-              <a:buNone/>
-            </a:pPr>
-            <a:r>
-              <a:rPr lang="en-IN" sz="1800" kern="100" dirty="0">
-                <a:effectLst/>
-                <a:latin typeface="Times New Roman" panose="02020603050405020304" pitchFamily="18" charset="0"/>
-                <a:ea typeface="Calibri" panose="020F0502020204030204" pitchFamily="34" charset="0"/>
-                <a:cs typeface="Times New Roman" panose="02020603050405020304" pitchFamily="18" charset="0"/>
-              </a:rPr>
-              <a:t>To safeguard multi-user data, we will use encryption with integrity controls. Advanced cryptographic techniques will be used to ensure data confidentiality and integrity, protecting sensitive information from unauthorized access and tampering.</a:t>
-            </a:r>
-            <a:endParaRPr lang="en-IN" sz="1800" kern="100" dirty="0">
-              <a:effectLst/>
-              <a:latin typeface="Calibri" panose="020F0502020204030204" pitchFamily="34" charset="0"/>
-              <a:ea typeface="Calibri" panose="020F0502020204030204" pitchFamily="34" charset="0"/>
-              <a:cs typeface="Times New Roman" panose="02020603050405020304" pitchFamily="18" charset="0"/>
-            </a:endParaRPr>
-          </a:p>
-          <a:p>
-            <a:pPr marL="228600" indent="0">
-              <a:buFont typeface="+mj-lt"/>
-              <a:buNone/>
-            </a:pPr>
-            <a:r>
-              <a:rPr lang="en-IN" sz="1800" kern="100" dirty="0">
-                <a:effectLst/>
-                <a:latin typeface="Times New Roman" panose="02020603050405020304" pitchFamily="18" charset="0"/>
-                <a:ea typeface="Calibri" panose="020F0502020204030204" pitchFamily="34" charset="0"/>
-                <a:cs typeface="Times New Roman" panose="02020603050405020304" pitchFamily="18" charset="0"/>
-              </a:rPr>
-              <a:t> </a:t>
-            </a:r>
-            <a:endParaRPr lang="en-IN" sz="1800" kern="100" dirty="0">
-              <a:effectLst/>
-              <a:latin typeface="Calibri" panose="020F0502020204030204" pitchFamily="34" charset="0"/>
-              <a:ea typeface="Calibri" panose="020F0502020204030204" pitchFamily="34" charset="0"/>
-              <a:cs typeface="Times New Roman" panose="02020603050405020304" pitchFamily="18" charset="0"/>
-            </a:endParaRPr>
-          </a:p>
-          <a:p>
-            <a:pPr marL="0" lvl="0" indent="0">
-              <a:buFont typeface="+mj-lt"/>
-              <a:buNone/>
-            </a:pPr>
-            <a:r>
-              <a:rPr lang="en-IN" sz="1800" kern="100" dirty="0">
-                <a:effectLst/>
-                <a:latin typeface="Times New Roman" panose="02020603050405020304" pitchFamily="18" charset="0"/>
-                <a:ea typeface="Calibri" panose="020F0502020204030204" pitchFamily="34" charset="0"/>
-                <a:cs typeface="Times New Roman" panose="02020603050405020304" pitchFamily="18" charset="0"/>
-              </a:rPr>
-              <a:t>Fine-Grained File Sharing:</a:t>
-            </a:r>
-            <a:endParaRPr lang="en-IN" sz="1800" kern="100" dirty="0">
-              <a:effectLst/>
-              <a:latin typeface="Calibri" panose="020F0502020204030204" pitchFamily="34" charset="0"/>
-              <a:ea typeface="Calibri" panose="020F0502020204030204" pitchFamily="34" charset="0"/>
-              <a:cs typeface="Times New Roman" panose="02020603050405020304" pitchFamily="18" charset="0"/>
-            </a:endParaRPr>
-          </a:p>
-          <a:p>
-            <a:pPr marL="228600" indent="0">
-              <a:buFont typeface="+mj-lt"/>
-              <a:buNone/>
-            </a:pPr>
-            <a:r>
-              <a:rPr lang="en-IN" sz="1800" kern="100" dirty="0">
-                <a:effectLst/>
-                <a:latin typeface="Times New Roman" panose="02020603050405020304" pitchFamily="18" charset="0"/>
-                <a:ea typeface="Calibri" panose="020F0502020204030204" pitchFamily="34" charset="0"/>
-                <a:cs typeface="Times New Roman" panose="02020603050405020304" pitchFamily="18" charset="0"/>
-              </a:rPr>
-              <a:t>The project will analyze and implement access control mechanisms to enable fine-grained file sharing between various components of the organization hierarchy. Attribute-based access control (ABAC) will be explored to handle complex access control policies efficiently.</a:t>
-            </a:r>
-            <a:endParaRPr lang="en-IN" sz="1800" kern="100" dirty="0">
-              <a:effectLst/>
-              <a:latin typeface="Calibri" panose="020F0502020204030204" pitchFamily="34" charset="0"/>
-              <a:ea typeface="Calibri" panose="020F0502020204030204" pitchFamily="34" charset="0"/>
-              <a:cs typeface="Times New Roman" panose="02020603050405020304" pitchFamily="18" charset="0"/>
-            </a:endParaRPr>
-          </a:p>
-          <a:p>
-            <a:pPr marL="228600" indent="0">
-              <a:buFont typeface="+mj-lt"/>
-              <a:buNone/>
-            </a:pPr>
-            <a:r>
-              <a:rPr lang="en-IN" sz="1800" kern="100" dirty="0">
-                <a:effectLst/>
-                <a:latin typeface="Times New Roman" panose="02020603050405020304" pitchFamily="18" charset="0"/>
-                <a:ea typeface="Calibri" panose="020F0502020204030204" pitchFamily="34" charset="0"/>
-                <a:cs typeface="Times New Roman" panose="02020603050405020304" pitchFamily="18" charset="0"/>
-              </a:rPr>
-              <a:t> </a:t>
-            </a:r>
-            <a:endParaRPr lang="en-IN" sz="1800" kern="100" dirty="0">
-              <a:effectLst/>
-              <a:latin typeface="Calibri" panose="020F0502020204030204" pitchFamily="34" charset="0"/>
-              <a:ea typeface="Calibri" panose="020F0502020204030204" pitchFamily="34" charset="0"/>
-              <a:cs typeface="Times New Roman" panose="02020603050405020304" pitchFamily="18" charset="0"/>
-            </a:endParaRPr>
-          </a:p>
-          <a:p>
-            <a:pPr marL="0" lvl="0" indent="0">
-              <a:buFont typeface="+mj-lt"/>
-              <a:buNone/>
-            </a:pPr>
-            <a:r>
-              <a:rPr lang="en-IN" sz="1800" kern="100" dirty="0">
-                <a:effectLst/>
-                <a:latin typeface="Times New Roman" panose="02020603050405020304" pitchFamily="18" charset="0"/>
-                <a:ea typeface="Calibri" panose="020F0502020204030204" pitchFamily="34" charset="0"/>
-                <a:cs typeface="Times New Roman" panose="02020603050405020304" pitchFamily="18" charset="0"/>
-              </a:rPr>
-              <a:t>Notifications for Policy Non-Compliance or Violations:</a:t>
-            </a:r>
-            <a:endParaRPr lang="en-IN" sz="1800" kern="100" dirty="0">
-              <a:effectLst/>
-              <a:latin typeface="Calibri" panose="020F0502020204030204" pitchFamily="34" charset="0"/>
-              <a:ea typeface="Calibri" panose="020F0502020204030204" pitchFamily="34" charset="0"/>
-              <a:cs typeface="Times New Roman" panose="02020603050405020304" pitchFamily="18" charset="0"/>
-            </a:endParaRPr>
-          </a:p>
-          <a:p>
-            <a:pPr marL="228600" indent="0">
-              <a:buFont typeface="+mj-lt"/>
-              <a:buNone/>
-            </a:pPr>
-            <a:r>
-              <a:rPr lang="en-IN" sz="1800" kern="100" dirty="0">
-                <a:effectLst/>
-                <a:latin typeface="Times New Roman" panose="02020603050405020304" pitchFamily="18" charset="0"/>
-                <a:ea typeface="Calibri" panose="020F0502020204030204" pitchFamily="34" charset="0"/>
-                <a:cs typeface="Times New Roman" panose="02020603050405020304" pitchFamily="18" charset="0"/>
-              </a:rPr>
-              <a:t>An essential aspect of the platform will be the incorporation of a notification system to alert relevant users and administrators in case of policy non-compliance or access control violations. Real-time notifications will be sent through emails, messages, and in-app alerts to promptly address any security breaches or policy violations.</a:t>
-            </a:r>
-            <a:endParaRPr lang="en-IN" sz="1800" kern="100" dirty="0">
-              <a:effectLst/>
-              <a:latin typeface="Calibri" panose="020F0502020204030204" pitchFamily="34" charset="0"/>
-              <a:ea typeface="Calibri" panose="020F0502020204030204" pitchFamily="34" charset="0"/>
-              <a:cs typeface="Times New Roman" panose="02020603050405020304" pitchFamily="18" charset="0"/>
-            </a:endParaRPr>
-          </a:p>
-          <a:p>
-            <a:pPr marL="228600" indent="0">
-              <a:buFont typeface="+mj-lt"/>
-              <a:buNone/>
-            </a:pPr>
             <a:endParaRPr lang="en-US" dirty="0"/>
           </a:p>
         </p:txBody>
@@ -4249,7 +3665,7 @@
     </p:spTree>
     <p:extLst>
       <p:ext uri="{BB962C8B-B14F-4D97-AF65-F5344CB8AC3E}">
-        <p14:creationId xmlns:p14="http://schemas.microsoft.com/office/powerpoint/2010/main" val="2109296654"/>
+        <p14:creationId xmlns:p14="http://schemas.microsoft.com/office/powerpoint/2010/main" val="331318494"/>
       </p:ext>
     </p:extLst>
   </p:cSld>
@@ -4370,7 +3786,7 @@
     </p:spTree>
     <p:extLst>
       <p:ext uri="{BB962C8B-B14F-4D97-AF65-F5344CB8AC3E}">
-        <p14:creationId xmlns:p14="http://schemas.microsoft.com/office/powerpoint/2010/main" val="331318494"/>
+        <p14:creationId xmlns:p14="http://schemas.microsoft.com/office/powerpoint/2010/main" val="1429434442"/>
       </p:ext>
     </p:extLst>
   </p:cSld>
@@ -16148,156 +15564,6 @@
       </p:sp>
       <p:sp>
         <p:nvSpPr>
-          <p:cNvPr id="3" name="Text Placeholder 2">
-            <a:extLst>
-              <a:ext uri="{FF2B5EF4-FFF2-40B4-BE49-F238E27FC236}">
-                <a16:creationId xmlns:a16="http://schemas.microsoft.com/office/drawing/2014/main" id="{7E465F83-15C1-F526-2728-78C93134D158}"/>
-              </a:ext>
-            </a:extLst>
-          </p:cNvPr>
-          <p:cNvSpPr>
-            <a:spLocks noGrp="1"/>
-          </p:cNvSpPr>
-          <p:nvPr>
-            <p:ph type="body" idx="1"/>
-          </p:nvPr>
-        </p:nvSpPr>
-        <p:spPr/>
-        <p:txBody>
-          <a:bodyPr>
-            <a:normAutofit fontScale="92500" lnSpcReduction="10000"/>
-          </a:bodyPr>
-          <a:lstStyle/>
-          <a:p>
-            <a:pPr marL="114300" indent="0">
-              <a:lnSpc>
-                <a:spcPct val="150000"/>
-              </a:lnSpc>
-              <a:buNone/>
-            </a:pPr>
-            <a:r>
-              <a:rPr lang="en-US" sz="1600" dirty="0">
-                <a:latin typeface="Avenir Book" panose="02000503020000020003" pitchFamily="2" charset="0"/>
-              </a:rPr>
-              <a:t>This policy applies to all personnel within the organization hierarchy, including any individuals/groups/organizations serving under a contract with Eventopolis:</a:t>
-            </a:r>
-          </a:p>
-          <a:p>
-            <a:pPr marL="114300" indent="0">
-              <a:lnSpc>
-                <a:spcPct val="150000"/>
-              </a:lnSpc>
-              <a:buNone/>
-            </a:pPr>
-            <a:r>
-              <a:rPr lang="en-US" sz="1600" b="1" dirty="0">
-                <a:latin typeface="Avenir Book" panose="02000503020000020003" pitchFamily="2" charset="0"/>
-              </a:rPr>
-              <a:t>1. The CEO</a:t>
-            </a:r>
-          </a:p>
-          <a:p>
-            <a:pPr marL="114300" indent="0">
-              <a:lnSpc>
-                <a:spcPct val="150000"/>
-              </a:lnSpc>
-              <a:buNone/>
-            </a:pPr>
-            <a:r>
-              <a:rPr lang="en-US" sz="1600" b="1" dirty="0">
-                <a:latin typeface="Avenir Book" panose="02000503020000020003" pitchFamily="2" charset="0"/>
-              </a:rPr>
-              <a:t>2. Other C-level Executives  - CTO, CISO</a:t>
-            </a:r>
-          </a:p>
-          <a:p>
-            <a:pPr marL="114300" indent="0">
-              <a:lnSpc>
-                <a:spcPct val="150000"/>
-              </a:lnSpc>
-              <a:buNone/>
-            </a:pPr>
-            <a:r>
-              <a:rPr lang="en-US" sz="1600" b="1" dirty="0">
-                <a:latin typeface="Avenir Book" panose="02000503020000020003" pitchFamily="2" charset="0"/>
-              </a:rPr>
-              <a:t>3. Horizontal Heads (Hospitality, Public Relations)</a:t>
-            </a:r>
-          </a:p>
-          <a:p>
-            <a:pPr marL="114300" indent="0">
-              <a:lnSpc>
-                <a:spcPct val="150000"/>
-              </a:lnSpc>
-              <a:buNone/>
-            </a:pPr>
-            <a:r>
-              <a:rPr lang="en-US" sz="1600" b="1" dirty="0">
-                <a:latin typeface="Avenir Book" panose="02000503020000020003" pitchFamily="2" charset="0"/>
-              </a:rPr>
-              <a:t>4. Project Managers (specific for each new event)</a:t>
-            </a:r>
-          </a:p>
-          <a:p>
-            <a:pPr marL="114300" indent="0">
-              <a:lnSpc>
-                <a:spcPct val="150000"/>
-              </a:lnSpc>
-              <a:buNone/>
-            </a:pPr>
-            <a:r>
-              <a:rPr lang="en-US" sz="1600" b="1" dirty="0">
-                <a:latin typeface="Avenir Book" panose="02000503020000020003" pitchFamily="2" charset="0"/>
-              </a:rPr>
-              <a:t>5. Vertical Heads (specific for each of the departments for every event being planned)</a:t>
-            </a:r>
-          </a:p>
-          <a:p>
-            <a:pPr marL="114300" indent="0">
-              <a:lnSpc>
-                <a:spcPct val="150000"/>
-              </a:lnSpc>
-              <a:buNone/>
-            </a:pPr>
-            <a:r>
-              <a:rPr lang="en-US" sz="1600" b="1" dirty="0">
-                <a:latin typeface="Avenir Book" panose="02000503020000020003" pitchFamily="2" charset="0"/>
-              </a:rPr>
-              <a:t>6. Third-party vendors (being contracted by the company)</a:t>
-            </a:r>
-          </a:p>
-          <a:p>
-            <a:pPr marL="114300" indent="0">
-              <a:lnSpc>
-                <a:spcPct val="150000"/>
-              </a:lnSpc>
-              <a:buNone/>
-            </a:pPr>
-            <a:r>
-              <a:rPr lang="en-US" sz="1600" b="1" dirty="0">
-                <a:latin typeface="Avenir Book" panose="02000503020000020003" pitchFamily="2" charset="0"/>
-              </a:rPr>
-              <a:t>7. Clients</a:t>
-            </a:r>
-          </a:p>
-          <a:p>
-            <a:pPr marL="114300" indent="0">
-              <a:lnSpc>
-                <a:spcPct val="150000"/>
-              </a:lnSpc>
-              <a:buNone/>
-            </a:pPr>
-            <a:r>
-              <a:rPr lang="en-US" sz="1600" dirty="0">
-                <a:latin typeface="Avenir Book" panose="02000503020000020003" pitchFamily="2" charset="0"/>
-              </a:rPr>
-              <a:t>Access to the general public is regulated solely through the deficit of any data security and privacy controls, as will be illustrated in the Data Classification section of this document.</a:t>
-            </a:r>
-          </a:p>
-        </p:txBody>
-      </p:sp>
-      <p:sp>
-        <p:nvSpPr>
           <p:cNvPr id="4" name="Slide Number Placeholder 3">
             <a:extLst>
               <a:ext uri="{FF2B5EF4-FFF2-40B4-BE49-F238E27FC236}">
@@ -16329,105 +15595,6 @@
             <a:fld id="{00000000-1234-1234-1234-123412341234}" type="slidenum">
               <a:rPr lang="en-US" smtClean="0"/>
               <a:t>10</a:t>
-            </a:fld>
-            <a:endParaRPr lang="en-US"/>
-          </a:p>
-        </p:txBody>
-      </p:sp>
-    </p:spTree>
-    <p:extLst>
-      <p:ext uri="{BB962C8B-B14F-4D97-AF65-F5344CB8AC3E}">
-        <p14:creationId xmlns:p14="http://schemas.microsoft.com/office/powerpoint/2010/main" val="1070684401"/>
-      </p:ext>
-    </p:extLst>
-  </p:cSld>
-  <p:clrMapOvr>
-    <a:masterClrMapping/>
-  </p:clrMapOvr>
-</p:sld>
-</file>
-
-<file path=ppt/slides/slide11.xml><?xml version="1.0" encoding="utf-8"?>
-<p:sld xmlns:a="http://schemas.openxmlformats.org/drawingml/2006/main" xmlns:r="http://schemas.openxmlformats.org/officeDocument/2006/relationships" xmlns:p="http://schemas.openxmlformats.org/presentationml/2006/main">
-  <p:cSld>
-    <p:spTree>
-      <p:nvGrpSpPr>
-        <p:cNvPr id="1" name=""/>
-        <p:cNvGrpSpPr/>
-        <p:nvPr/>
-      </p:nvGrpSpPr>
-      <p:grpSpPr>
-        <a:xfrm>
-          <a:off x="0" y="0"/>
-          <a:ext cx="0" cy="0"/>
-          <a:chOff x="0" y="0"/>
-          <a:chExt cx="0" cy="0"/>
-        </a:xfrm>
-      </p:grpSpPr>
-      <p:sp>
-        <p:nvSpPr>
-          <p:cNvPr id="2" name="Title 1">
-            <a:extLst>
-              <a:ext uri="{FF2B5EF4-FFF2-40B4-BE49-F238E27FC236}">
-                <a16:creationId xmlns:a16="http://schemas.microsoft.com/office/drawing/2014/main" id="{CFFE4D37-2125-9C71-88A1-7C7A183A1B30}"/>
-              </a:ext>
-            </a:extLst>
-          </p:cNvPr>
-          <p:cNvSpPr>
-            <a:spLocks noGrp="1"/>
-          </p:cNvSpPr>
-          <p:nvPr>
-            <p:ph type="title"/>
-          </p:nvPr>
-        </p:nvSpPr>
-        <p:spPr/>
-        <p:txBody>
-          <a:bodyPr/>
-          <a:lstStyle/>
-          <a:p>
-            <a:pPr algn="l"/>
-            <a:r>
-              <a:rPr lang="en-US" dirty="0">
-                <a:latin typeface="Avenir Book" panose="02000503020000020003" pitchFamily="2" charset="0"/>
-              </a:rPr>
-              <a:t>Applicability</a:t>
-            </a:r>
-          </a:p>
-        </p:txBody>
-      </p:sp>
-      <p:sp>
-        <p:nvSpPr>
-          <p:cNvPr id="4" name="Slide Number Placeholder 3">
-            <a:extLst>
-              <a:ext uri="{FF2B5EF4-FFF2-40B4-BE49-F238E27FC236}">
-                <a16:creationId xmlns:a16="http://schemas.microsoft.com/office/drawing/2014/main" id="{93FAAE68-68C3-5EE5-5341-231E77051849}"/>
-              </a:ext>
-            </a:extLst>
-          </p:cNvPr>
-          <p:cNvSpPr>
-            <a:spLocks noGrp="1"/>
-          </p:cNvSpPr>
-          <p:nvPr>
-            <p:ph type="sldNum" idx="12"/>
-          </p:nvPr>
-        </p:nvSpPr>
-        <p:spPr/>
-        <p:txBody>
-          <a:bodyPr/>
-          <a:lstStyle/>
-          <a:p>
-            <a:pPr marL="0" lvl="0" indent="0" algn="r" rtl="0">
-              <a:spcBef>
-                <a:spcPts val="0"/>
-              </a:spcBef>
-              <a:spcAft>
-                <a:spcPts val="0"/>
-              </a:spcAft>
-              <a:buNone/>
-            </a:pPr>
-            <a:fld id="{00000000-1234-1234-1234-123412341234}" type="slidenum">
-              <a:rPr lang="en-US" smtClean="0"/>
-              <a:t>11</a:t>
             </a:fld>
             <a:endParaRPr lang="en-US"/>
           </a:p>
@@ -16536,7 +15703,7 @@
 </p:sld>
 </file>
 
-<file path=ppt/slides/slide12.xml><?xml version="1.0" encoding="utf-8"?>
+<file path=ppt/slides/slide11.xml><?xml version="1.0" encoding="utf-8"?>
 <p:sld xmlns:a="http://schemas.openxmlformats.org/drawingml/2006/main" xmlns:r="http://schemas.openxmlformats.org/officeDocument/2006/relationships" xmlns:p="http://schemas.openxmlformats.org/presentationml/2006/main">
   <p:cSld>
     <p:spTree>
@@ -16616,7 +15783,7 @@
             </a:pPr>
             <a:fld id="{00000000-1234-1234-1234-123412341234}" type="slidenum">
               <a:rPr lang="en-US" smtClean="0"/>
-              <a:t>12</a:t>
+              <a:t>11</a:t>
             </a:fld>
             <a:endParaRPr lang="en-US"/>
           </a:p>
@@ -16682,6 +15849,134 @@
 </p:sld>
 </file>
 
+<file path=ppt/slides/slide12.xml><?xml version="1.0" encoding="utf-8"?>
+<p:sld xmlns:a="http://schemas.openxmlformats.org/drawingml/2006/main" xmlns:r="http://schemas.openxmlformats.org/officeDocument/2006/relationships" xmlns:p="http://schemas.openxmlformats.org/presentationml/2006/main">
+  <p:cSld>
+    <p:spTree>
+      <p:nvGrpSpPr>
+        <p:cNvPr id="1" name=""/>
+        <p:cNvGrpSpPr/>
+        <p:nvPr/>
+      </p:nvGrpSpPr>
+      <p:grpSpPr>
+        <a:xfrm>
+          <a:off x="0" y="0"/>
+          <a:ext cx="0" cy="0"/>
+          <a:chOff x="0" y="0"/>
+          <a:chExt cx="0" cy="0"/>
+        </a:xfrm>
+      </p:grpSpPr>
+      <p:sp>
+        <p:nvSpPr>
+          <p:cNvPr id="2" name="Title 1">
+            <a:extLst>
+              <a:ext uri="{FF2B5EF4-FFF2-40B4-BE49-F238E27FC236}">
+                <a16:creationId xmlns:a16="http://schemas.microsoft.com/office/drawing/2014/main" id="{CFFE4D37-2125-9C71-88A1-7C7A183A1B30}"/>
+              </a:ext>
+            </a:extLst>
+          </p:cNvPr>
+          <p:cNvSpPr>
+            <a:spLocks noGrp="1"/>
+          </p:cNvSpPr>
+          <p:nvPr>
+            <p:ph type="title"/>
+          </p:nvPr>
+        </p:nvSpPr>
+        <p:spPr/>
+        <p:txBody>
+          <a:bodyPr/>
+          <a:lstStyle/>
+          <a:p>
+            <a:pPr algn="l"/>
+            <a:r>
+              <a:rPr lang="en-US" dirty="0">
+                <a:latin typeface="Avenir Book" panose="02000503020000020003" pitchFamily="2" charset="0"/>
+              </a:rPr>
+              <a:t>System Architecture</a:t>
+            </a:r>
+          </a:p>
+        </p:txBody>
+      </p:sp>
+      <p:sp>
+        <p:nvSpPr>
+          <p:cNvPr id="4" name="Slide Number Placeholder 3">
+            <a:extLst>
+              <a:ext uri="{FF2B5EF4-FFF2-40B4-BE49-F238E27FC236}">
+                <a16:creationId xmlns:a16="http://schemas.microsoft.com/office/drawing/2014/main" id="{93FAAE68-68C3-5EE5-5341-231E77051849}"/>
+              </a:ext>
+            </a:extLst>
+          </p:cNvPr>
+          <p:cNvSpPr>
+            <a:spLocks noGrp="1"/>
+          </p:cNvSpPr>
+          <p:nvPr>
+            <p:ph type="sldNum" idx="12"/>
+          </p:nvPr>
+        </p:nvSpPr>
+        <p:spPr/>
+        <p:txBody>
+          <a:bodyPr/>
+          <a:lstStyle/>
+          <a:p>
+            <a:pPr marL="0" lvl="0" indent="0" algn="r" rtl="0">
+              <a:spcBef>
+                <a:spcPts val="0"/>
+              </a:spcBef>
+              <a:spcAft>
+                <a:spcPts val="0"/>
+              </a:spcAft>
+              <a:buNone/>
+            </a:pPr>
+            <a:fld id="{00000000-1234-1234-1234-123412341234}" type="slidenum">
+              <a:rPr lang="en-US" smtClean="0"/>
+              <a:t>12</a:t>
+            </a:fld>
+            <a:endParaRPr lang="en-US"/>
+          </a:p>
+        </p:txBody>
+      </p:sp>
+      <p:pic>
+        <p:nvPicPr>
+          <p:cNvPr id="3" name="Picture 2">
+            <a:extLst>
+              <a:ext uri="{FF2B5EF4-FFF2-40B4-BE49-F238E27FC236}">
+                <a16:creationId xmlns:a16="http://schemas.microsoft.com/office/drawing/2014/main" id="{10FEB99D-FA89-9B51-2A72-EEB7D2E98D02}"/>
+              </a:ext>
+            </a:extLst>
+          </p:cNvPr>
+          <p:cNvPicPr>
+            <a:picLocks noChangeAspect="1"/>
+          </p:cNvPicPr>
+          <p:nvPr/>
+        </p:nvPicPr>
+        <p:blipFill rotWithShape="1">
+          <a:blip r:embed="rId3"/>
+          <a:srcRect l="8485" t="11201" r="16834" b="13866"/>
+          <a:stretch/>
+        </p:blipFill>
+        <p:spPr>
+          <a:xfrm>
+            <a:off x="457200" y="2209800"/>
+            <a:ext cx="5662246" cy="4120662"/>
+          </a:xfrm>
+          <a:prstGeom prst="rect">
+            <a:avLst/>
+          </a:prstGeom>
+        </p:spPr>
+      </p:pic>
+    </p:spTree>
+    <p:extLst>
+      <p:ext uri="{BB962C8B-B14F-4D97-AF65-F5344CB8AC3E}">
+        <p14:creationId xmlns:p14="http://schemas.microsoft.com/office/powerpoint/2010/main" val="163473690"/>
+      </p:ext>
+    </p:extLst>
+  </p:cSld>
+  <p:clrMapOvr>
+    <a:masterClrMapping/>
+  </p:clrMapOvr>
+</p:sld>
+</file>
+
 <file path=ppt/slides/slide13.xml><?xml version="1.0" encoding="utf-8"?>
 <p:sld xmlns:a="http://schemas.openxmlformats.org/drawingml/2006/main" xmlns:r="http://schemas.openxmlformats.org/officeDocument/2006/relationships" xmlns:p="http://schemas.openxmlformats.org/presentationml/2006/main">
   <p:cSld>
@@ -16725,7 +16020,7 @@
               <a:rPr lang="en-US" dirty="0">
                 <a:latin typeface="Avenir Book" panose="02000503020000020003" pitchFamily="2" charset="0"/>
               </a:rPr>
-              <a:t>System Architecture</a:t>
+              <a:t>Practical Implementation</a:t>
             </a:r>
           </a:p>
         </p:txBody>
@@ -16768,39 +16063,111 @@
           </a:p>
         </p:txBody>
       </p:sp>
-      <p:pic>
-        <p:nvPicPr>
-          <p:cNvPr id="3" name="Picture 2">
+      <p:sp>
+        <p:nvSpPr>
+          <p:cNvPr id="3" name="Text Placeholder 2">
             <a:extLst>
               <a:ext uri="{FF2B5EF4-FFF2-40B4-BE49-F238E27FC236}">
-                <a16:creationId xmlns:a16="http://schemas.microsoft.com/office/drawing/2014/main" id="{10FEB99D-FA89-9B51-2A72-EEB7D2E98D02}"/>
+                <a16:creationId xmlns:a16="http://schemas.microsoft.com/office/drawing/2014/main" id="{2D7861D7-CA83-4CB5-3C6B-16DFE08EB884}"/>
               </a:ext>
             </a:extLst>
           </p:cNvPr>
-          <p:cNvPicPr>
-            <a:picLocks noChangeAspect="1"/>
-          </p:cNvPicPr>
-          <p:nvPr/>
-        </p:nvPicPr>
-        <p:blipFill rotWithShape="1">
-          <a:blip r:embed="rId3"/>
-          <a:srcRect l="8485" t="11201" r="16834" b="13866"/>
-          <a:stretch/>
-        </p:blipFill>
+          <p:cNvSpPr>
+            <a:spLocks noGrp="1"/>
+          </p:cNvSpPr>
+          <p:nvPr>
+            <p:ph type="body" idx="1"/>
+          </p:nvPr>
+        </p:nvSpPr>
         <p:spPr>
           <a:xfrm>
-            <a:off x="457200" y="2209800"/>
-            <a:ext cx="5662246" cy="4120662"/>
+            <a:off x="457200" y="2286000"/>
+            <a:ext cx="8229600" cy="4070351"/>
           </a:xfrm>
-          <a:prstGeom prst="rect">
-            <a:avLst/>
-          </a:prstGeom>
         </p:spPr>
-      </p:pic>
+        <p:txBody>
+          <a:bodyPr>
+            <a:normAutofit/>
+          </a:bodyPr>
+          <a:lstStyle/>
+          <a:p>
+            <a:pPr>
+              <a:lnSpc>
+                <a:spcPct val="150000"/>
+              </a:lnSpc>
+              <a:buFont typeface="Wingdings" pitchFamily="2" charset="2"/>
+              <a:buChar char="ü"/>
+            </a:pPr>
+            <a:r>
+              <a:rPr lang="en-US" sz="1600" dirty="0">
+                <a:latin typeface="Avenir Book" panose="02000503020000020003" pitchFamily="2" charset="0"/>
+              </a:rPr>
+              <a:t>Sepolia and Metamask</a:t>
+            </a:r>
+          </a:p>
+          <a:p>
+            <a:pPr>
+              <a:lnSpc>
+                <a:spcPct val="150000"/>
+              </a:lnSpc>
+              <a:buFont typeface="Wingdings" pitchFamily="2" charset="2"/>
+              <a:buChar char="ü"/>
+            </a:pPr>
+            <a:r>
+              <a:rPr lang="en-US" sz="1600" dirty="0">
+                <a:latin typeface="Avenir Book" panose="02000503020000020003" pitchFamily="2" charset="0"/>
+              </a:rPr>
+              <a:t>Helia</a:t>
+            </a:r>
+          </a:p>
+          <a:p>
+            <a:pPr>
+              <a:lnSpc>
+                <a:spcPct val="150000"/>
+              </a:lnSpc>
+              <a:buFont typeface="Wingdings" pitchFamily="2" charset="2"/>
+              <a:buChar char="ü"/>
+            </a:pPr>
+            <a:r>
+              <a:rPr lang="en-US" sz="1600" dirty="0">
+                <a:latin typeface="Avenir Book" panose="02000503020000020003" pitchFamily="2" charset="0"/>
+              </a:rPr>
+              <a:t>Solidity Smart Contracts</a:t>
+            </a:r>
+          </a:p>
+          <a:p>
+            <a:pPr>
+              <a:lnSpc>
+                <a:spcPct val="150000"/>
+              </a:lnSpc>
+              <a:buFont typeface="Wingdings" pitchFamily="2" charset="2"/>
+              <a:buChar char="ü"/>
+            </a:pPr>
+            <a:r>
+              <a:rPr lang="en-US" sz="1600" dirty="0">
+                <a:latin typeface="Avenir Book" panose="02000503020000020003" pitchFamily="2" charset="0"/>
+              </a:rPr>
+              <a:t>IPFS</a:t>
+            </a:r>
+          </a:p>
+          <a:p>
+            <a:pPr>
+              <a:lnSpc>
+                <a:spcPct val="150000"/>
+              </a:lnSpc>
+              <a:buFont typeface="Wingdings" pitchFamily="2" charset="2"/>
+              <a:buChar char="ü"/>
+            </a:pPr>
+            <a:endParaRPr lang="en-US" sz="1600" dirty="0">
+              <a:latin typeface="Avenir Book" panose="02000503020000020003" pitchFamily="2" charset="0"/>
+            </a:endParaRPr>
+          </a:p>
+        </p:txBody>
+      </p:sp>
     </p:spTree>
     <p:extLst>
       <p:ext uri="{BB962C8B-B14F-4D97-AF65-F5344CB8AC3E}">
-        <p14:creationId xmlns:p14="http://schemas.microsoft.com/office/powerpoint/2010/main" val="163473690"/>
+        <p14:creationId xmlns:p14="http://schemas.microsoft.com/office/powerpoint/2010/main" val="374413903"/>
       </p:ext>
     </p:extLst>
   </p:cSld>
@@ -16853,8 +16220,172 @@
               <a:rPr lang="en-US" dirty="0">
                 <a:latin typeface="Avenir Book" panose="02000503020000020003" pitchFamily="2" charset="0"/>
               </a:rPr>
-              <a:t>Practical Implementation</a:t>
+              <a:t>Key Features </a:t>
             </a:r>
+            <a:r>
+              <a:rPr lang="en-US">
+                <a:latin typeface="Avenir Book" panose="02000503020000020003" pitchFamily="2" charset="0"/>
+              </a:rPr>
+              <a:t>and USPs</a:t>
+            </a:r>
+            <a:endParaRPr lang="en-US" dirty="0">
+              <a:latin typeface="Avenir Book" panose="02000503020000020003" pitchFamily="2" charset="0"/>
+            </a:endParaRPr>
+          </a:p>
+        </p:txBody>
+      </p:sp>
+      <p:sp>
+        <p:nvSpPr>
+          <p:cNvPr id="3" name="Text Placeholder 2">
+            <a:extLst>
+              <a:ext uri="{FF2B5EF4-FFF2-40B4-BE49-F238E27FC236}">
+                <a16:creationId xmlns:a16="http://schemas.microsoft.com/office/drawing/2014/main" id="{7E465F83-15C1-F526-2728-78C93134D158}"/>
+              </a:ext>
+            </a:extLst>
+          </p:cNvPr>
+          <p:cNvSpPr>
+            <a:spLocks noGrp="1"/>
+          </p:cNvSpPr>
+          <p:nvPr>
+            <p:ph type="body" idx="1"/>
+          </p:nvPr>
+        </p:nvSpPr>
+        <p:spPr/>
+        <p:txBody>
+          <a:bodyPr>
+            <a:normAutofit fontScale="92500" lnSpcReduction="10000"/>
+          </a:bodyPr>
+          <a:lstStyle/>
+          <a:p>
+            <a:pPr>
+              <a:lnSpc>
+                <a:spcPct val="200000"/>
+              </a:lnSpc>
+              <a:buFont typeface="Courier New" panose="02070309020205020404" pitchFamily="49" charset="0"/>
+              <a:buChar char="o"/>
+            </a:pPr>
+            <a:r>
+              <a:rPr lang="en-US" sz="1600" dirty="0">
+                <a:latin typeface="Avenir Book" panose="02000503020000020003" pitchFamily="2" charset="0"/>
+              </a:rPr>
+              <a:t>Smart contracts: self-executing protocols, eliminates the need for intermediaries</a:t>
+            </a:r>
+          </a:p>
+          <a:p>
+            <a:pPr>
+              <a:lnSpc>
+                <a:spcPct val="200000"/>
+              </a:lnSpc>
+              <a:buFont typeface="Courier New" panose="02070309020205020404" pitchFamily="49" charset="0"/>
+              <a:buChar char="o"/>
+            </a:pPr>
+            <a:r>
+              <a:rPr lang="en-US" sz="1600" dirty="0">
+                <a:latin typeface="Avenir Book" panose="02000503020000020003" pitchFamily="2" charset="0"/>
+              </a:rPr>
+              <a:t>Resistant to collusion and manipulation</a:t>
+            </a:r>
+          </a:p>
+          <a:p>
+            <a:pPr>
+              <a:lnSpc>
+                <a:spcPct val="200000"/>
+              </a:lnSpc>
+              <a:buFont typeface="Courier New" panose="02070309020205020404" pitchFamily="49" charset="0"/>
+              <a:buChar char="o"/>
+            </a:pPr>
+            <a:r>
+              <a:rPr lang="en-US" sz="1600" dirty="0">
+                <a:latin typeface="Avenir Book" panose="02000503020000020003" pitchFamily="2" charset="0"/>
+              </a:rPr>
+              <a:t>Increases immunity to social engineering</a:t>
+            </a:r>
+          </a:p>
+          <a:p>
+            <a:pPr>
+              <a:lnSpc>
+                <a:spcPct val="200000"/>
+              </a:lnSpc>
+              <a:buFont typeface="Courier New" panose="02070309020205020404" pitchFamily="49" charset="0"/>
+              <a:buChar char="o"/>
+            </a:pPr>
+            <a:r>
+              <a:rPr lang="en-US" sz="1600" dirty="0">
+                <a:latin typeface="Avenir Book" panose="02000503020000020003" pitchFamily="2" charset="0"/>
+              </a:rPr>
+              <a:t>Enhances auditability and traceability </a:t>
+            </a:r>
+          </a:p>
+          <a:p>
+            <a:pPr>
+              <a:lnSpc>
+                <a:spcPct val="200000"/>
+              </a:lnSpc>
+              <a:buFont typeface="Courier New" panose="02070309020205020404" pitchFamily="49" charset="0"/>
+              <a:buChar char="o"/>
+            </a:pPr>
+            <a:r>
+              <a:rPr lang="en-US" sz="1600" dirty="0">
+                <a:latin typeface="Avenir Book" panose="02000503020000020003" pitchFamily="2" charset="0"/>
+              </a:rPr>
+              <a:t>Ensures policy and regulatory compliance</a:t>
+            </a:r>
+          </a:p>
+          <a:p>
+            <a:pPr>
+              <a:lnSpc>
+                <a:spcPct val="200000"/>
+              </a:lnSpc>
+              <a:buFont typeface="Courier New" panose="02070309020205020404" pitchFamily="49" charset="0"/>
+              <a:buChar char="o"/>
+            </a:pPr>
+            <a:r>
+              <a:rPr lang="en-US" sz="1600" dirty="0">
+                <a:latin typeface="Avenir Book" panose="02000503020000020003" pitchFamily="2" charset="0"/>
+              </a:rPr>
+              <a:t>More prompt notifications in case of suspicious activity </a:t>
+            </a:r>
+          </a:p>
+          <a:p>
+            <a:pPr>
+              <a:lnSpc>
+                <a:spcPct val="200000"/>
+              </a:lnSpc>
+              <a:buFont typeface="Courier New" panose="02070309020205020404" pitchFamily="49" charset="0"/>
+              <a:buChar char="o"/>
+            </a:pPr>
+            <a:r>
+              <a:rPr lang="en-US" sz="1600" dirty="0">
+                <a:latin typeface="Avenir Book" panose="02000503020000020003" pitchFamily="2" charset="0"/>
+              </a:rPr>
+              <a:t>Scalability and performance</a:t>
+            </a:r>
+          </a:p>
+          <a:p>
+            <a:pPr>
+              <a:lnSpc>
+                <a:spcPct val="200000"/>
+              </a:lnSpc>
+              <a:buFont typeface="Courier New" panose="02070309020205020404" pitchFamily="49" charset="0"/>
+              <a:buChar char="o"/>
+            </a:pPr>
+            <a:r>
+              <a:rPr lang="en-US" sz="1600" dirty="0">
+                <a:latin typeface="Avenir Book" panose="02000503020000020003" pitchFamily="2" charset="0"/>
+              </a:rPr>
+              <a:t>Future scope in IoT-related data sharing </a:t>
+            </a:r>
+          </a:p>
+          <a:p>
+            <a:pPr marL="114300" indent="0">
+              <a:lnSpc>
+                <a:spcPct val="110000"/>
+              </a:lnSpc>
+              <a:buNone/>
+            </a:pPr>
+            <a:endParaRPr lang="en-US" sz="1600" dirty="0">
+              <a:latin typeface="Avenir Book" panose="02000503020000020003" pitchFamily="2" charset="0"/>
+            </a:endParaRPr>
           </a:p>
         </p:txBody>
       </p:sp>
@@ -16896,111 +16427,10 @@
           </a:p>
         </p:txBody>
       </p:sp>
-      <p:sp>
-        <p:nvSpPr>
-          <p:cNvPr id="3" name="Text Placeholder 2">
-            <a:extLst>
-              <a:ext uri="{FF2B5EF4-FFF2-40B4-BE49-F238E27FC236}">
-                <a16:creationId xmlns:a16="http://schemas.microsoft.com/office/drawing/2014/main" id="{2D7861D7-CA83-4CB5-3C6B-16DFE08EB884}"/>
-              </a:ext>
-            </a:extLst>
-          </p:cNvPr>
-          <p:cNvSpPr>
-            <a:spLocks noGrp="1"/>
-          </p:cNvSpPr>
-          <p:nvPr>
-            <p:ph type="body" idx="1"/>
-          </p:nvPr>
-        </p:nvSpPr>
-        <p:spPr>
-          <a:xfrm>
-            <a:off x="457200" y="2286000"/>
-            <a:ext cx="8229600" cy="4070351"/>
-          </a:xfrm>
-        </p:spPr>
-        <p:txBody>
-          <a:bodyPr>
-            <a:normAutofit/>
-          </a:bodyPr>
-          <a:lstStyle/>
-          <a:p>
-            <a:pPr>
-              <a:lnSpc>
-                <a:spcPct val="150000"/>
-              </a:lnSpc>
-              <a:buFont typeface="Wingdings" pitchFamily="2" charset="2"/>
-              <a:buChar char="ü"/>
-            </a:pPr>
-            <a:r>
-              <a:rPr lang="en-US" sz="1600" dirty="0">
-                <a:latin typeface="Avenir Book" panose="02000503020000020003" pitchFamily="2" charset="0"/>
-              </a:rPr>
-              <a:t>Sepolia and Metamask</a:t>
-            </a:r>
-          </a:p>
-          <a:p>
-            <a:pPr>
-              <a:lnSpc>
-                <a:spcPct val="150000"/>
-              </a:lnSpc>
-              <a:buFont typeface="Wingdings" pitchFamily="2" charset="2"/>
-              <a:buChar char="ü"/>
-            </a:pPr>
-            <a:r>
-              <a:rPr lang="en-US" sz="1600" dirty="0">
-                <a:latin typeface="Avenir Book" panose="02000503020000020003" pitchFamily="2" charset="0"/>
-              </a:rPr>
-              <a:t>Helia</a:t>
-            </a:r>
-          </a:p>
-          <a:p>
-            <a:pPr>
-              <a:lnSpc>
-                <a:spcPct val="150000"/>
-              </a:lnSpc>
-              <a:buFont typeface="Wingdings" pitchFamily="2" charset="2"/>
-              <a:buChar char="ü"/>
-            </a:pPr>
-            <a:r>
-              <a:rPr lang="en-US" sz="1600" dirty="0">
-                <a:latin typeface="Avenir Book" panose="02000503020000020003" pitchFamily="2" charset="0"/>
-              </a:rPr>
-              <a:t>Solidity Smart Contracts</a:t>
-            </a:r>
-          </a:p>
-          <a:p>
-            <a:pPr>
-              <a:lnSpc>
-                <a:spcPct val="150000"/>
-              </a:lnSpc>
-              <a:buFont typeface="Wingdings" pitchFamily="2" charset="2"/>
-              <a:buChar char="ü"/>
-            </a:pPr>
-            <a:r>
-              <a:rPr lang="en-US" sz="1600" dirty="0">
-                <a:latin typeface="Avenir Book" panose="02000503020000020003" pitchFamily="2" charset="0"/>
-              </a:rPr>
-              <a:t>IPFS</a:t>
-            </a:r>
-          </a:p>
-          <a:p>
-            <a:pPr>
-              <a:lnSpc>
-                <a:spcPct val="150000"/>
-              </a:lnSpc>
-              <a:buFont typeface="Wingdings" pitchFamily="2" charset="2"/>
-              <a:buChar char="ü"/>
-            </a:pPr>
-            <a:endParaRPr lang="en-US" sz="1600" dirty="0">
-              <a:latin typeface="Avenir Book" panose="02000503020000020003" pitchFamily="2" charset="0"/>
-            </a:endParaRPr>
-          </a:p>
-        </p:txBody>
-      </p:sp>
     </p:spTree>
     <p:extLst>
       <p:ext uri="{BB962C8B-B14F-4D97-AF65-F5344CB8AC3E}">
-        <p14:creationId xmlns:p14="http://schemas.microsoft.com/office/powerpoint/2010/main" val="374413903"/>
+        <p14:creationId xmlns:p14="http://schemas.microsoft.com/office/powerpoint/2010/main" val="2088575882"/>
       </p:ext>
     </p:extLst>
   </p:cSld>
@@ -17053,269 +16483,6 @@
               <a:rPr lang="en-US" dirty="0">
                 <a:latin typeface="Avenir Book" panose="02000503020000020003" pitchFamily="2" charset="0"/>
               </a:rPr>
-              <a:t>Key Features </a:t>
-            </a:r>
-            <a:r>
-              <a:rPr lang="en-US">
-                <a:latin typeface="Avenir Book" panose="02000503020000020003" pitchFamily="2" charset="0"/>
-              </a:rPr>
-              <a:t>and USPs</a:t>
-            </a:r>
-            <a:endParaRPr lang="en-US" dirty="0">
-              <a:latin typeface="Avenir Book" panose="02000503020000020003" pitchFamily="2" charset="0"/>
-            </a:endParaRPr>
-          </a:p>
-        </p:txBody>
-      </p:sp>
-      <p:sp>
-        <p:nvSpPr>
-          <p:cNvPr id="3" name="Text Placeholder 2">
-            <a:extLst>
-              <a:ext uri="{FF2B5EF4-FFF2-40B4-BE49-F238E27FC236}">
-                <a16:creationId xmlns:a16="http://schemas.microsoft.com/office/drawing/2014/main" id="{7E465F83-15C1-F526-2728-78C93134D158}"/>
-              </a:ext>
-            </a:extLst>
-          </p:cNvPr>
-          <p:cNvSpPr>
-            <a:spLocks noGrp="1"/>
-          </p:cNvSpPr>
-          <p:nvPr>
-            <p:ph type="body" idx="1"/>
-          </p:nvPr>
-        </p:nvSpPr>
-        <p:spPr/>
-        <p:txBody>
-          <a:bodyPr>
-            <a:normAutofit fontScale="92500" lnSpcReduction="10000"/>
-          </a:bodyPr>
-          <a:lstStyle/>
-          <a:p>
-            <a:pPr>
-              <a:lnSpc>
-                <a:spcPct val="200000"/>
-              </a:lnSpc>
-              <a:buFont typeface="Courier New" panose="02070309020205020404" pitchFamily="49" charset="0"/>
-              <a:buChar char="o"/>
-            </a:pPr>
-            <a:r>
-              <a:rPr lang="en-US" sz="1600" dirty="0">
-                <a:latin typeface="Avenir Book" panose="02000503020000020003" pitchFamily="2" charset="0"/>
-              </a:rPr>
-              <a:t>Smart contracts: self-executing protocols, eliminates the need for intermediaries</a:t>
-            </a:r>
-          </a:p>
-          <a:p>
-            <a:pPr>
-              <a:lnSpc>
-                <a:spcPct val="200000"/>
-              </a:lnSpc>
-              <a:buFont typeface="Courier New" panose="02070309020205020404" pitchFamily="49" charset="0"/>
-              <a:buChar char="o"/>
-            </a:pPr>
-            <a:r>
-              <a:rPr lang="en-US" sz="1600" dirty="0">
-                <a:latin typeface="Avenir Book" panose="02000503020000020003" pitchFamily="2" charset="0"/>
-              </a:rPr>
-              <a:t>Resistant to collusion and manipulation</a:t>
-            </a:r>
-          </a:p>
-          <a:p>
-            <a:pPr>
-              <a:lnSpc>
-                <a:spcPct val="200000"/>
-              </a:lnSpc>
-              <a:buFont typeface="Courier New" panose="02070309020205020404" pitchFamily="49" charset="0"/>
-              <a:buChar char="o"/>
-            </a:pPr>
-            <a:r>
-              <a:rPr lang="en-US" sz="1600" dirty="0">
-                <a:latin typeface="Avenir Book" panose="02000503020000020003" pitchFamily="2" charset="0"/>
-              </a:rPr>
-              <a:t>Increases immunity to social engineering</a:t>
-            </a:r>
-          </a:p>
-          <a:p>
-            <a:pPr>
-              <a:lnSpc>
-                <a:spcPct val="200000"/>
-              </a:lnSpc>
-              <a:buFont typeface="Courier New" panose="02070309020205020404" pitchFamily="49" charset="0"/>
-              <a:buChar char="o"/>
-            </a:pPr>
-            <a:r>
-              <a:rPr lang="en-US" sz="1600" dirty="0">
-                <a:latin typeface="Avenir Book" panose="02000503020000020003" pitchFamily="2" charset="0"/>
-              </a:rPr>
-              <a:t>Enhances auditability and traceability </a:t>
-            </a:r>
-          </a:p>
-          <a:p>
-            <a:pPr>
-              <a:lnSpc>
-                <a:spcPct val="200000"/>
-              </a:lnSpc>
-              <a:buFont typeface="Courier New" panose="02070309020205020404" pitchFamily="49" charset="0"/>
-              <a:buChar char="o"/>
-            </a:pPr>
-            <a:r>
-              <a:rPr lang="en-US" sz="1600" dirty="0">
-                <a:latin typeface="Avenir Book" panose="02000503020000020003" pitchFamily="2" charset="0"/>
-              </a:rPr>
-              <a:t>Ensures policy and regulatory compliance</a:t>
-            </a:r>
-          </a:p>
-          <a:p>
-            <a:pPr>
-              <a:lnSpc>
-                <a:spcPct val="200000"/>
-              </a:lnSpc>
-              <a:buFont typeface="Courier New" panose="02070309020205020404" pitchFamily="49" charset="0"/>
-              <a:buChar char="o"/>
-            </a:pPr>
-            <a:r>
-              <a:rPr lang="en-US" sz="1600" dirty="0">
-                <a:latin typeface="Avenir Book" panose="02000503020000020003" pitchFamily="2" charset="0"/>
-              </a:rPr>
-              <a:t>More prompt notifications in case of suspicious activity </a:t>
-            </a:r>
-          </a:p>
-          <a:p>
-            <a:pPr>
-              <a:lnSpc>
-                <a:spcPct val="200000"/>
-              </a:lnSpc>
-              <a:buFont typeface="Courier New" panose="02070309020205020404" pitchFamily="49" charset="0"/>
-              <a:buChar char="o"/>
-            </a:pPr>
-            <a:r>
-              <a:rPr lang="en-US" sz="1600" dirty="0">
-                <a:latin typeface="Avenir Book" panose="02000503020000020003" pitchFamily="2" charset="0"/>
-              </a:rPr>
-              <a:t>Scalability and performance</a:t>
-            </a:r>
-          </a:p>
-          <a:p>
-            <a:pPr>
-              <a:lnSpc>
-                <a:spcPct val="200000"/>
-              </a:lnSpc>
-              <a:buFont typeface="Courier New" panose="02070309020205020404" pitchFamily="49" charset="0"/>
-              <a:buChar char="o"/>
-            </a:pPr>
-            <a:r>
-              <a:rPr lang="en-US" sz="1600" dirty="0">
-                <a:latin typeface="Avenir Book" panose="02000503020000020003" pitchFamily="2" charset="0"/>
-              </a:rPr>
-              <a:t>Future scope in IoT-related data sharing </a:t>
-            </a:r>
-          </a:p>
-          <a:p>
-            <a:pPr marL="114300" indent="0">
-              <a:lnSpc>
-                <a:spcPct val="110000"/>
-              </a:lnSpc>
-              <a:buNone/>
-            </a:pPr>
-            <a:endParaRPr lang="en-US" sz="1600" dirty="0">
-              <a:latin typeface="Avenir Book" panose="02000503020000020003" pitchFamily="2" charset="0"/>
-            </a:endParaRPr>
-          </a:p>
-        </p:txBody>
-      </p:sp>
-      <p:sp>
-        <p:nvSpPr>
-          <p:cNvPr id="4" name="Slide Number Placeholder 3">
-            <a:extLst>
-              <a:ext uri="{FF2B5EF4-FFF2-40B4-BE49-F238E27FC236}">
-                <a16:creationId xmlns:a16="http://schemas.microsoft.com/office/drawing/2014/main" id="{93FAAE68-68C3-5EE5-5341-231E77051849}"/>
-              </a:ext>
-            </a:extLst>
-          </p:cNvPr>
-          <p:cNvSpPr>
-            <a:spLocks noGrp="1"/>
-          </p:cNvSpPr>
-          <p:nvPr>
-            <p:ph type="sldNum" idx="12"/>
-          </p:nvPr>
-        </p:nvSpPr>
-        <p:spPr/>
-        <p:txBody>
-          <a:bodyPr/>
-          <a:lstStyle/>
-          <a:p>
-            <a:pPr marL="0" lvl="0" indent="0" algn="r" rtl="0">
-              <a:spcBef>
-                <a:spcPts val="0"/>
-              </a:spcBef>
-              <a:spcAft>
-                <a:spcPts val="0"/>
-              </a:spcAft>
-              <a:buNone/>
-            </a:pPr>
-            <a:fld id="{00000000-1234-1234-1234-123412341234}" type="slidenum">
-              <a:rPr lang="en-US" smtClean="0"/>
-              <a:t>15</a:t>
-            </a:fld>
-            <a:endParaRPr lang="en-US"/>
-          </a:p>
-        </p:txBody>
-      </p:sp>
-    </p:spTree>
-    <p:extLst>
-      <p:ext uri="{BB962C8B-B14F-4D97-AF65-F5344CB8AC3E}">
-        <p14:creationId xmlns:p14="http://schemas.microsoft.com/office/powerpoint/2010/main" val="2088575882"/>
-      </p:ext>
-    </p:extLst>
-  </p:cSld>
-  <p:clrMapOvr>
-    <a:masterClrMapping/>
-  </p:clrMapOvr>
-</p:sld>
-</file>
-
-<file path=ppt/slides/slide16.xml><?xml version="1.0" encoding="utf-8"?>
-<p:sld xmlns:a="http://schemas.openxmlformats.org/drawingml/2006/main" xmlns:r="http://schemas.openxmlformats.org/officeDocument/2006/relationships" xmlns:p="http://schemas.openxmlformats.org/presentationml/2006/main">
-  <p:cSld>
-    <p:spTree>
-      <p:nvGrpSpPr>
-        <p:cNvPr id="1" name=""/>
-        <p:cNvGrpSpPr/>
-        <p:nvPr/>
-      </p:nvGrpSpPr>
-      <p:grpSpPr>
-        <a:xfrm>
-          <a:off x="0" y="0"/>
-          <a:ext cx="0" cy="0"/>
-          <a:chOff x="0" y="0"/>
-          <a:chExt cx="0" cy="0"/>
-        </a:xfrm>
-      </p:grpSpPr>
-      <p:sp>
-        <p:nvSpPr>
-          <p:cNvPr id="2" name="Title 1">
-            <a:extLst>
-              <a:ext uri="{FF2B5EF4-FFF2-40B4-BE49-F238E27FC236}">
-                <a16:creationId xmlns:a16="http://schemas.microsoft.com/office/drawing/2014/main" id="{CFFE4D37-2125-9C71-88A1-7C7A183A1B30}"/>
-              </a:ext>
-            </a:extLst>
-          </p:cNvPr>
-          <p:cNvSpPr>
-            <a:spLocks noGrp="1"/>
-          </p:cNvSpPr>
-          <p:nvPr>
-            <p:ph type="title"/>
-          </p:nvPr>
-        </p:nvSpPr>
-        <p:spPr/>
-        <p:txBody>
-          <a:bodyPr/>
-          <a:lstStyle/>
-          <a:p>
-            <a:pPr algn="l"/>
-            <a:r>
-              <a:rPr lang="en-US" dirty="0">
-                <a:latin typeface="Avenir Book" panose="02000503020000020003" pitchFamily="2" charset="0"/>
-              </a:rPr>
               <a:t>Literature Survey</a:t>
             </a:r>
           </a:p>
@@ -17571,7 +16738,7 @@
             </a:pPr>
             <a:fld id="{00000000-1234-1234-1234-123412341234}" type="slidenum">
               <a:rPr lang="en-US" smtClean="0"/>
-              <a:t>16</a:t>
+              <a:t>15</a:t>
             </a:fld>
             <a:endParaRPr lang="en-US"/>
           </a:p>
@@ -19492,7 +18659,7 @@
               <a:rPr lang="en-US" dirty="0">
                 <a:latin typeface="Avenir Book" panose="02000503020000020003" pitchFamily="2" charset="0"/>
               </a:rPr>
-              <a:t>Objectives &amp; Scope</a:t>
+              <a:t>Applicability</a:t>
             </a:r>
           </a:p>
         </p:txBody>
@@ -19520,114 +18687,34 @@
           </a:bodyPr>
           <a:lstStyle/>
           <a:p>
-            <a:pPr>
-              <a:lnSpc>
-                <a:spcPct val="200000"/>
-              </a:lnSpc>
-              <a:buFont typeface="Courier New" panose="02070309020205020404" pitchFamily="49" charset="0"/>
-              <a:buChar char="o"/>
+            <a:pPr marL="114300" indent="0">
+              <a:lnSpc>
+                <a:spcPct val="150000"/>
+              </a:lnSpc>
+              <a:buNone/>
             </a:pPr>
             <a:r>
               <a:rPr lang="en-US" sz="1600" dirty="0">
                 <a:latin typeface="Avenir Book" panose="02000503020000020003" pitchFamily="2" charset="0"/>
               </a:rPr>
-              <a:t>Blockchain-controlled Data Sharing</a:t>
+              <a:t>For the scope of this project, we have developed this web application “on contract” for an event management company called Eventopolis. We are referring to the software as ‘Sentinel Share’ and the policies and use cases we have developed are in accordance with the same context.</a:t>
             </a:r>
           </a:p>
           <a:p>
-            <a:pPr>
-              <a:lnSpc>
-                <a:spcPct val="200000"/>
-              </a:lnSpc>
-              <a:buFont typeface="Courier New" panose="02070309020205020404" pitchFamily="49" charset="0"/>
-              <a:buChar char="o"/>
+            <a:pPr marL="114300" indent="0">
+              <a:lnSpc>
+                <a:spcPct val="150000"/>
+              </a:lnSpc>
+              <a:buNone/>
             </a:pPr>
-            <a:r>
-              <a:rPr lang="en-US" sz="1600" dirty="0">
-                <a:latin typeface="Avenir Book" panose="02000503020000020003" pitchFamily="2" charset="0"/>
-              </a:rPr>
-              <a:t>Multi-user Access &amp; Role-based Authentication</a:t>
-            </a:r>
-          </a:p>
-          <a:p>
-            <a:pPr>
-              <a:lnSpc>
-                <a:spcPct val="200000"/>
-              </a:lnSpc>
-              <a:buFont typeface="Courier New" panose="02070309020205020404" pitchFamily="49" charset="0"/>
-              <a:buChar char="o"/>
-            </a:pPr>
-            <a:r>
-              <a:rPr lang="en-US" sz="1600" dirty="0">
-                <a:latin typeface="Avenir Book" panose="02000503020000020003" pitchFamily="2" charset="0"/>
-              </a:rPr>
-              <a:t>Persistent Metadata Management</a:t>
-            </a:r>
-          </a:p>
-          <a:p>
-            <a:pPr>
-              <a:lnSpc>
-                <a:spcPct val="200000"/>
-              </a:lnSpc>
-              <a:buFont typeface="Courier New" panose="02070309020205020404" pitchFamily="49" charset="0"/>
-              <a:buChar char="o"/>
-            </a:pPr>
-            <a:r>
-              <a:rPr lang="en-US" sz="1600" dirty="0">
-                <a:latin typeface="Avenir Book" panose="02000503020000020003" pitchFamily="2" charset="0"/>
-              </a:rPr>
-              <a:t>End-point Security Measures</a:t>
-            </a:r>
-          </a:p>
-          <a:p>
-            <a:pPr>
-              <a:lnSpc>
-                <a:spcPct val="200000"/>
-              </a:lnSpc>
-              <a:buFont typeface="Courier New" panose="02070309020205020404" pitchFamily="49" charset="0"/>
-              <a:buChar char="o"/>
-            </a:pPr>
-            <a:r>
-              <a:rPr lang="en-US" sz="1600" dirty="0">
-                <a:latin typeface="Avenir Book" panose="02000503020000020003" pitchFamily="2" charset="0"/>
-              </a:rPr>
-              <a:t>Encryption with Integrity Controls</a:t>
-            </a:r>
-          </a:p>
-          <a:p>
-            <a:pPr>
-              <a:lnSpc>
-                <a:spcPct val="200000"/>
-              </a:lnSpc>
-              <a:buFont typeface="Courier New" panose="02070309020205020404" pitchFamily="49" charset="0"/>
-              <a:buChar char="o"/>
-            </a:pPr>
-            <a:r>
-              <a:rPr lang="en-US" sz="1600" dirty="0">
-                <a:latin typeface="Avenir Book" panose="02000503020000020003" pitchFamily="2" charset="0"/>
-              </a:rPr>
-              <a:t>Fine-grained File Sharing</a:t>
-            </a:r>
-          </a:p>
-          <a:p>
-            <a:pPr>
-              <a:lnSpc>
-                <a:spcPct val="200000"/>
-              </a:lnSpc>
-              <a:buFont typeface="Courier New" panose="02070309020205020404" pitchFamily="49" charset="0"/>
-              <a:buChar char="o"/>
-            </a:pPr>
-            <a:r>
-              <a:rPr lang="en-US" sz="1600" dirty="0">
-                <a:latin typeface="Avenir Book" panose="02000503020000020003" pitchFamily="2" charset="0"/>
-              </a:rPr>
-              <a:t>Notifications for policy non-compliance or violations</a:t>
-            </a:r>
+            <a:endParaRPr lang="en-US" sz="1600" dirty="0">
+              <a:latin typeface="Avenir Book" panose="02000503020000020003" pitchFamily="2" charset="0"/>
+            </a:endParaRPr>
           </a:p>
           <a:p>
             <a:pPr marL="114300" indent="0">
               <a:lnSpc>
-                <a:spcPct val="200000"/>
+                <a:spcPct val="150000"/>
               </a:lnSpc>
               <a:buNone/>
             </a:pPr>
@@ -19678,7 +18765,7 @@
     </p:spTree>
     <p:extLst>
       <p:ext uri="{BB962C8B-B14F-4D97-AF65-F5344CB8AC3E}">
-        <p14:creationId xmlns:p14="http://schemas.microsoft.com/office/powerpoint/2010/main" val="3849201164"/>
+        <p14:creationId xmlns:p14="http://schemas.microsoft.com/office/powerpoint/2010/main" val="1182253864"/>
       </p:ext>
     </p:extLst>
   </p:cSld>
@@ -19755,7 +18842,7 @@
         <p:spPr/>
         <p:txBody>
           <a:bodyPr>
-            <a:normAutofit/>
+            <a:normAutofit fontScale="92500" lnSpcReduction="10000"/>
           </a:bodyPr>
           <a:lstStyle/>
           <a:p>
@@ -19769,7 +18856,7 @@
               <a:rPr lang="en-US" sz="1600" dirty="0">
                 <a:latin typeface="Avenir Book" panose="02000503020000020003" pitchFamily="2" charset="0"/>
               </a:rPr>
-              <a:t>For the scope of this project, we have developed this web application “on contract” for an event management company called Eventopolis. We are referring to the software as ‘Sentinel Share’ and the policies and use cases we have developed are in accordance with the same context.</a:t>
+              <a:t>This policy applies to all personnel within the organization hierarchy, including any individuals/groups/organizations serving under a contract with Eventopolis:</a:t>
             </a:r>
           </a:p>
           <a:p>
@@ -19779,9 +18866,12 @@
               </a:lnSpc>
               <a:buNone/>
             </a:pPr>
-            <a:endParaRPr lang="en-US" sz="1600" dirty="0">
-              <a:latin typeface="Avenir Book" panose="02000503020000020003" pitchFamily="2" charset="0"/>
-            </a:endParaRPr>
+            <a:r>
+              <a:rPr lang="en-US" sz="1600" b="1" dirty="0">
+                <a:latin typeface="Avenir Book" panose="02000503020000020003" pitchFamily="2" charset="0"/>
+              </a:rPr>
+              <a:t>1. The CEO</a:t>
+            </a:r>
           </a:p>
           <a:p>
             <a:pPr marL="114300" indent="0">
@@ -19790,9 +18880,96 @@
               </a:lnSpc>
               <a:buNone/>
             </a:pPr>
-            <a:endParaRPr lang="en-US" sz="1600" dirty="0">
-              <a:latin typeface="Avenir Book" panose="02000503020000020003" pitchFamily="2" charset="0"/>
-            </a:endParaRPr>
+            <a:r>
+              <a:rPr lang="en-US" sz="1600" b="1" dirty="0">
+                <a:latin typeface="Avenir Book" panose="02000503020000020003" pitchFamily="2" charset="0"/>
+              </a:rPr>
+              <a:t>2. Other C-level Executives  - CTO, CISO</a:t>
+            </a:r>
+          </a:p>
+          <a:p>
+            <a:pPr marL="114300" indent="0">
+              <a:lnSpc>
+                <a:spcPct val="150000"/>
+              </a:lnSpc>
+              <a:buNone/>
+            </a:pPr>
+            <a:r>
+              <a:rPr lang="en-US" sz="1600" b="1" dirty="0">
+                <a:latin typeface="Avenir Book" panose="02000503020000020003" pitchFamily="2" charset="0"/>
+              </a:rPr>
+              <a:t>3. Horizontal Heads (Hospitality, Public Relations)</a:t>
+            </a:r>
+          </a:p>
+          <a:p>
+            <a:pPr marL="114300" indent="0">
+              <a:lnSpc>
+                <a:spcPct val="150000"/>
+              </a:lnSpc>
+              <a:buNone/>
+            </a:pPr>
+            <a:r>
+              <a:rPr lang="en-US" sz="1600" b="1" dirty="0">
+                <a:latin typeface="Avenir Book" panose="02000503020000020003" pitchFamily="2" charset="0"/>
+              </a:rPr>
+              <a:t>4. Project Managers (specific for each new event)</a:t>
+            </a:r>
+          </a:p>
+          <a:p>
+            <a:pPr marL="114300" indent="0">
+              <a:lnSpc>
+                <a:spcPct val="150000"/>
+              </a:lnSpc>
+              <a:buNone/>
+            </a:pPr>
+            <a:r>
+              <a:rPr lang="en-US" sz="1600" b="1" dirty="0">
+                <a:latin typeface="Avenir Book" panose="02000503020000020003" pitchFamily="2" charset="0"/>
+              </a:rPr>
+              <a:t>5. Vertical Heads (specific for each of the departments for every event being planned)</a:t>
+            </a:r>
+          </a:p>
+          <a:p>
+            <a:pPr marL="114300" indent="0">
+              <a:lnSpc>
+                <a:spcPct val="150000"/>
+              </a:lnSpc>
+              <a:buNone/>
+            </a:pPr>
+            <a:r>
+              <a:rPr lang="en-US" sz="1600" b="1" dirty="0">
+                <a:latin typeface="Avenir Book" panose="02000503020000020003" pitchFamily="2" charset="0"/>
+              </a:rPr>
+              <a:t>6. Third-party vendors (being contracted by the company)</a:t>
+            </a:r>
+          </a:p>
+          <a:p>
+            <a:pPr marL="114300" indent="0">
+              <a:lnSpc>
+                <a:spcPct val="150000"/>
+              </a:lnSpc>
+              <a:buNone/>
+            </a:pPr>
+            <a:r>
+              <a:rPr lang="en-US" sz="1600" b="1" dirty="0">
+                <a:latin typeface="Avenir Book" panose="02000503020000020003" pitchFamily="2" charset="0"/>
+              </a:rPr>
+              <a:t>7. Clients</a:t>
+            </a:r>
+          </a:p>
+          <a:p>
+            <a:pPr marL="114300" indent="0">
+              <a:lnSpc>
+                <a:spcPct val="150000"/>
+              </a:lnSpc>
+              <a:buNone/>
+            </a:pPr>
+            <a:r>
+              <a:rPr lang="en-US" sz="1600" dirty="0">
+                <a:latin typeface="Avenir Book" panose="02000503020000020003" pitchFamily="2" charset="0"/>
+              </a:rPr>
+              <a:t>Access to the general public is regulated solely through the deficit of any data security and privacy controls, as will be illustrated in the Data Classification section of this document.</a:t>
+            </a:r>
           </a:p>
         </p:txBody>
       </p:sp>
@@ -19837,7 +19014,7 @@
     </p:spTree>
     <p:extLst>
       <p:ext uri="{BB962C8B-B14F-4D97-AF65-F5344CB8AC3E}">
-        <p14:creationId xmlns:p14="http://schemas.microsoft.com/office/powerpoint/2010/main" val="1182253864"/>
+        <p14:creationId xmlns:p14="http://schemas.microsoft.com/office/powerpoint/2010/main" val="1070684401"/>
       </p:ext>
     </p:extLst>
   </p:cSld>

</xml_diff>